<commit_message>
corrected the Docker installation in the ppt.
</commit_message>
<xml_diff>
--- a/Docker/Docker_Tutorial.pptx
+++ b/Docker/Docker_Tutorial.pptx
@@ -203,7 +203,7 @@
           <a:p>
             <a:fld id="{4C32271A-8C73-4D86-BAB6-7E0DDB3CE906}" type="datetimeFigureOut">
               <a:rPr lang="en-US" smtClean="0"/>
-              <a:t>7/7/2017</a:t>
+              <a:t>7/25/2017</a:t>
             </a:fld>
             <a:endParaRPr lang="en-US"/>
           </a:p>
@@ -898,7 +898,7 @@
           <a:p>
             <a:fld id="{D8D5993A-BDE8-4DA1-A758-DF79A4A926A0}" type="datetimeFigureOut">
               <a:rPr lang="en-US" smtClean="0"/>
-              <a:t>7/7/2017</a:t>
+              <a:t>7/25/2017</a:t>
             </a:fld>
             <a:endParaRPr lang="en-US"/>
           </a:p>
@@ -1068,7 +1068,7 @@
           <a:p>
             <a:fld id="{D8D5993A-BDE8-4DA1-A758-DF79A4A926A0}" type="datetimeFigureOut">
               <a:rPr lang="en-US" smtClean="0"/>
-              <a:t>7/7/2017</a:t>
+              <a:t>7/25/2017</a:t>
             </a:fld>
             <a:endParaRPr lang="en-US"/>
           </a:p>
@@ -1248,7 +1248,7 @@
           <a:p>
             <a:fld id="{D8D5993A-BDE8-4DA1-A758-DF79A4A926A0}" type="datetimeFigureOut">
               <a:rPr lang="en-US" smtClean="0"/>
-              <a:t>7/7/2017</a:t>
+              <a:t>7/25/2017</a:t>
             </a:fld>
             <a:endParaRPr lang="en-US"/>
           </a:p>
@@ -1418,7 +1418,7 @@
           <a:p>
             <a:fld id="{D8D5993A-BDE8-4DA1-A758-DF79A4A926A0}" type="datetimeFigureOut">
               <a:rPr lang="en-US" smtClean="0"/>
-              <a:t>7/7/2017</a:t>
+              <a:t>7/25/2017</a:t>
             </a:fld>
             <a:endParaRPr lang="en-US"/>
           </a:p>
@@ -1664,7 +1664,7 @@
           <a:p>
             <a:fld id="{D8D5993A-BDE8-4DA1-A758-DF79A4A926A0}" type="datetimeFigureOut">
               <a:rPr lang="en-US" smtClean="0"/>
-              <a:t>7/7/2017</a:t>
+              <a:t>7/25/2017</a:t>
             </a:fld>
             <a:endParaRPr lang="en-US"/>
           </a:p>
@@ -1952,7 +1952,7 @@
           <a:p>
             <a:fld id="{D8D5993A-BDE8-4DA1-A758-DF79A4A926A0}" type="datetimeFigureOut">
               <a:rPr lang="en-US" smtClean="0"/>
-              <a:t>7/7/2017</a:t>
+              <a:t>7/25/2017</a:t>
             </a:fld>
             <a:endParaRPr lang="en-US"/>
           </a:p>
@@ -2374,7 +2374,7 @@
           <a:p>
             <a:fld id="{D8D5993A-BDE8-4DA1-A758-DF79A4A926A0}" type="datetimeFigureOut">
               <a:rPr lang="en-US" smtClean="0"/>
-              <a:t>7/7/2017</a:t>
+              <a:t>7/25/2017</a:t>
             </a:fld>
             <a:endParaRPr lang="en-US"/>
           </a:p>
@@ -2492,7 +2492,7 @@
           <a:p>
             <a:fld id="{D8D5993A-BDE8-4DA1-A758-DF79A4A926A0}" type="datetimeFigureOut">
               <a:rPr lang="en-US" smtClean="0"/>
-              <a:t>7/7/2017</a:t>
+              <a:t>7/25/2017</a:t>
             </a:fld>
             <a:endParaRPr lang="en-US"/>
           </a:p>
@@ -2587,7 +2587,7 @@
           <a:p>
             <a:fld id="{D8D5993A-BDE8-4DA1-A758-DF79A4A926A0}" type="datetimeFigureOut">
               <a:rPr lang="en-US" smtClean="0"/>
-              <a:t>7/7/2017</a:t>
+              <a:t>7/25/2017</a:t>
             </a:fld>
             <a:endParaRPr lang="en-US"/>
           </a:p>
@@ -2864,7 +2864,7 @@
           <a:p>
             <a:fld id="{D8D5993A-BDE8-4DA1-A758-DF79A4A926A0}" type="datetimeFigureOut">
               <a:rPr lang="en-US" smtClean="0"/>
-              <a:t>7/7/2017</a:t>
+              <a:t>7/25/2017</a:t>
             </a:fld>
             <a:endParaRPr lang="en-US"/>
           </a:p>
@@ -3117,7 +3117,7 @@
           <a:p>
             <a:fld id="{D8D5993A-BDE8-4DA1-A758-DF79A4A926A0}" type="datetimeFigureOut">
               <a:rPr lang="en-US" smtClean="0"/>
-              <a:t>7/7/2017</a:t>
+              <a:t>7/25/2017</a:t>
             </a:fld>
             <a:endParaRPr lang="en-US"/>
           </a:p>
@@ -3330,7 +3330,7 @@
           <a:p>
             <a:fld id="{D8D5993A-BDE8-4DA1-A758-DF79A4A926A0}" type="datetimeFigureOut">
               <a:rPr lang="en-US" smtClean="0"/>
-              <a:t>7/7/2017</a:t>
+              <a:t>7/25/2017</a:t>
             </a:fld>
             <a:endParaRPr lang="en-US"/>
           </a:p>
@@ -6108,7 +6108,7 @@
         <p:spPr>
           <a:xfrm>
             <a:off x="344760" y="795010"/>
-            <a:ext cx="8305800" cy="5909310"/>
+            <a:ext cx="8305800" cy="5078313"/>
           </a:xfrm>
           <a:prstGeom prst="rect">
             <a:avLst/>
@@ -6214,76 +6214,34 @@
           </a:p>
           <a:p>
             <a:r>
-              <a:rPr lang="en-US" dirty="0" smtClean="0">
+              <a:rPr lang="sv-SE" dirty="0">
                 <a:hlinkClick r:id="rId2"/>
               </a:rPr>
-              <a:t>www.get.docker.com</a:t>
-            </a:r>
-            <a:endParaRPr lang="en-US" dirty="0" smtClean="0"/>
+              <a:t>https://docs.docker.com/engine/installation/linux/centos</a:t>
+            </a:r>
+            <a:r>
+              <a:rPr lang="sv-SE" dirty="0" smtClean="0">
+                <a:hlinkClick r:id="rId2"/>
+              </a:rPr>
+              <a:t>/</a:t>
+            </a:r>
+            <a:r>
+              <a:rPr lang="sv-SE" dirty="0" smtClean="0"/>
+              <a:t>  </a:t>
+            </a:r>
+          </a:p>
+          <a:p>
+            <a:endParaRPr lang="sv-SE" dirty="0"/>
+          </a:p>
+          <a:p>
+            <a:r>
+              <a:rPr lang="sv-SE" dirty="0" smtClean="0"/>
+              <a:t>Follow the steps to install CE (community edition)</a:t>
+            </a:r>
+            <a:endParaRPr lang="sv-SE" dirty="0"/>
           </a:p>
           <a:p>
             <a:endParaRPr lang="en-US" dirty="0"/>
-          </a:p>
-          <a:p>
-            <a:r>
-              <a:rPr lang="en-US" dirty="0" smtClean="0"/>
-              <a:t>Copy the </a:t>
-            </a:r>
-          </a:p>
-          <a:p>
-            <a:endParaRPr lang="en-US" dirty="0"/>
-          </a:p>
-          <a:p>
-            <a:r>
-              <a:rPr lang="en-US" dirty="0" smtClean="0"/>
-              <a:t>'</a:t>
-            </a:r>
-            <a:r>
-              <a:rPr lang="en-US" dirty="0" err="1" smtClean="0"/>
-              <a:t>wget</a:t>
-            </a:r>
-            <a:r>
-              <a:rPr lang="en-US" dirty="0" smtClean="0"/>
-              <a:t> </a:t>
-            </a:r>
-            <a:r>
-              <a:rPr lang="en-US" dirty="0"/>
-              <a:t>-</a:t>
-            </a:r>
-            <a:r>
-              <a:rPr lang="en-US" dirty="0" err="1"/>
-              <a:t>qO</a:t>
-            </a:r>
-            <a:r>
-              <a:rPr lang="en-US" dirty="0"/>
-              <a:t>- https://get.docker.com/ | </a:t>
-            </a:r>
-            <a:r>
-              <a:rPr lang="en-US" dirty="0" err="1" smtClean="0"/>
-              <a:t>sh</a:t>
-            </a:r>
-            <a:r>
-              <a:rPr lang="en-US" dirty="0" smtClean="0"/>
-              <a:t>‘</a:t>
-            </a:r>
-            <a:endParaRPr lang="en-US" dirty="0"/>
-          </a:p>
-          <a:p>
-            <a:r>
-              <a:rPr lang="en-US" dirty="0" smtClean="0"/>
-              <a:t>To your terminal and hit enter use | </a:t>
-            </a:r>
-            <a:r>
-              <a:rPr lang="en-US" dirty="0" err="1" smtClean="0"/>
-              <a:t>sh</a:t>
-            </a:r>
-            <a:r>
-              <a:rPr lang="en-US" dirty="0" smtClean="0"/>
-              <a:t> if not root user else not. </a:t>
-            </a:r>
-          </a:p>
-          <a:p>
-            <a:endParaRPr lang="en-US" dirty="0" smtClean="0"/>
           </a:p>
           <a:p>
             <a:r>
@@ -6292,7 +6250,15 @@
                   <a:srgbClr val="C00000"/>
                 </a:solidFill>
               </a:rPr>
-              <a:t>Step 2</a:t>
+              <a:t>Step </a:t>
+            </a:r>
+            <a:r>
+              <a:rPr lang="en-US" dirty="0" smtClean="0">
+                <a:solidFill>
+                  <a:srgbClr val="C00000"/>
+                </a:solidFill>
+              </a:rPr>
+              <a:t>2</a:t>
             </a:r>
             <a:r>
               <a:rPr lang="en-US" dirty="0" smtClean="0"/>
@@ -6309,9 +6275,14 @@
               <a:t>docker</a:t>
             </a:r>
             <a:r>
-              <a:rPr lang="en-US" dirty="0" smtClean="0"/>
-              <a:t> version</a:t>
-            </a:r>
+              <a:rPr lang="en-US" smtClean="0"/>
+              <a:t> </a:t>
+            </a:r>
+            <a:r>
+              <a:rPr lang="en-US" smtClean="0"/>
+              <a:t>--version</a:t>
+            </a:r>
+            <a:endParaRPr lang="en-US" dirty="0" smtClean="0"/>
           </a:p>
           <a:p>
             <a:endParaRPr lang="en-US" dirty="0">
@@ -6322,7 +6293,7 @@
           </a:p>
           <a:p>
             <a:r>
-              <a:rPr lang="en-US" smtClean="0">
+              <a:rPr lang="en-US" dirty="0" smtClean="0">
                 <a:solidFill>
                   <a:srgbClr val="C00000"/>
                 </a:solidFill>
@@ -6330,12 +6301,8 @@
               <a:t>Step 3</a:t>
             </a:r>
             <a:r>
-              <a:rPr lang="en-US" smtClean="0"/>
-              <a:t>: </a:t>
-            </a:r>
-            <a:r>
               <a:rPr lang="en-US" dirty="0" smtClean="0"/>
-              <a:t>Check for Docker service is running </a:t>
+              <a:t>: Check for Docker service is running </a:t>
             </a:r>
           </a:p>
           <a:p>
@@ -6354,60 +6321,6 @@
           </a:p>
         </p:txBody>
       </p:sp>
-      <p:pic>
-        <p:nvPicPr>
-          <p:cNvPr id="1026" name="Picture 2"/>
-          <p:cNvPicPr>
-            <a:picLocks noChangeAspect="1" noChangeArrowheads="1"/>
-          </p:cNvPicPr>
-          <p:nvPr/>
-        </p:nvPicPr>
-        <p:blipFill>
-          <a:blip r:embed="rId3">
-            <a:extLst>
-              <a:ext uri="{28A0092B-C50C-407E-A947-70E740481C1C}">
-                <a14:useLocalDpi xmlns:a14="http://schemas.microsoft.com/office/drawing/2010/main" val="0"/>
-              </a:ext>
-            </a:extLst>
-          </a:blip>
-          <a:srcRect/>
-          <a:stretch>
-            <a:fillRect/>
-          </a:stretch>
-        </p:blipFill>
-        <p:spPr bwMode="auto">
-          <a:xfrm>
-            <a:off x="3480992" y="3048000"/>
-            <a:ext cx="5181600" cy="1219200"/>
-          </a:xfrm>
-          <a:prstGeom prst="rect">
-            <a:avLst/>
-          </a:prstGeom>
-          <a:noFill/>
-          <a:ln>
-            <a:noFill/>
-          </a:ln>
-          <a:extLst>
-            <a:ext uri="{909E8E84-426E-40DD-AFC4-6F175D3DCCD1}">
-              <a14:hiddenFill xmlns:a14="http://schemas.microsoft.com/office/drawing/2010/main">
-                <a:solidFill>
-                  <a:schemeClr val="accent1"/>
-                </a:solidFill>
-              </a14:hiddenFill>
-            </a:ext>
-            <a:ext uri="{91240B29-F687-4F45-9708-019B960494DF}">
-              <a14:hiddenLine xmlns:a14="http://schemas.microsoft.com/office/drawing/2010/main" w="9525">
-                <a:solidFill>
-                  <a:schemeClr val="tx1"/>
-                </a:solidFill>
-                <a:miter lim="800000"/>
-                <a:headEnd/>
-                <a:tailEnd/>
-              </a14:hiddenLine>
-            </a:ext>
-          </a:extLst>
-        </p:spPr>
-      </p:pic>
     </p:spTree>
     <p:extLst>
       <p:ext uri="{BB962C8B-B14F-4D97-AF65-F5344CB8AC3E}">

</xml_diff>

<commit_message>
corrected image command in docker ppt
</commit_message>
<xml_diff>
--- a/Docker/Docker_Tutorial.pptx
+++ b/Docker/Docker_Tutorial.pptx
@@ -6250,15 +6250,7 @@
                   <a:srgbClr val="C00000"/>
                 </a:solidFill>
               </a:rPr>
-              <a:t>Step </a:t>
-            </a:r>
-            <a:r>
-              <a:rPr lang="en-US" dirty="0" smtClean="0">
-                <a:solidFill>
-                  <a:srgbClr val="C00000"/>
-                </a:solidFill>
-              </a:rPr>
-              <a:t>2</a:t>
+              <a:t>Step 2</a:t>
             </a:r>
             <a:r>
               <a:rPr lang="en-US" dirty="0" smtClean="0"/>
@@ -6275,14 +6267,9 @@
               <a:t>docker</a:t>
             </a:r>
             <a:r>
-              <a:rPr lang="en-US" smtClean="0"/>
-              <a:t> </a:t>
-            </a:r>
-            <a:r>
-              <a:rPr lang="en-US" smtClean="0"/>
-              <a:t>--version</a:t>
-            </a:r>
-            <a:endParaRPr lang="en-US" dirty="0" smtClean="0"/>
+              <a:rPr lang="en-US" dirty="0" smtClean="0"/>
+              <a:t> --version</a:t>
+            </a:r>
           </a:p>
           <a:p>
             <a:endParaRPr lang="en-US" dirty="0">
@@ -6331,6 +6318,13 @@
   <p:clrMapOvr>
     <a:masterClrMapping/>
   </p:clrMapOvr>
+  <p:timing>
+    <p:tnLst>
+      <p:par>
+        <p:cTn id="1" dur="indefinite" restart="never" nodeType="tmRoot"/>
+      </p:par>
+    </p:tnLst>
+  </p:timing>
 </p:sld>
 </file>
 
@@ -6729,6 +6723,13 @@
   <p:clrMapOvr>
     <a:masterClrMapping/>
   </p:clrMapOvr>
+  <p:timing>
+    <p:tnLst>
+      <p:par>
+        <p:cTn id="1" dur="indefinite" restart="never" nodeType="tmRoot"/>
+      </p:par>
+    </p:tnLst>
+  </p:timing>
 </p:sld>
 </file>
 
@@ -6815,13 +6816,14 @@
               <a:t>docker</a:t>
             </a:r>
             <a:r>
-              <a:rPr lang="en-US" b="1" i="1" dirty="0"/>
+              <a:rPr lang="en-US" b="1" i="1"/>
               <a:t> </a:t>
             </a:r>
             <a:r>
-              <a:rPr lang="en-US" b="1" i="1" dirty="0" smtClean="0"/>
-              <a:t>images</a:t>
-            </a:r>
+              <a:rPr lang="en-US" b="1" i="1" smtClean="0"/>
+              <a:t>images ls</a:t>
+            </a:r>
+            <a:endParaRPr lang="en-US" b="1" i="1" dirty="0" smtClean="0"/>
           </a:p>
           <a:p>
             <a:r>
@@ -7160,6 +7162,13 @@
   <p:clrMapOvr>
     <a:masterClrMapping/>
   </p:clrMapOvr>
+  <p:timing>
+    <p:tnLst>
+      <p:par>
+        <p:cTn id="1" dur="indefinite" restart="never" nodeType="tmRoot"/>
+      </p:par>
+    </p:tnLst>
+  </p:timing>
 </p:sld>
 </file>
 

</xml_diff>

<commit_message>
completed the docker ppt.
</commit_message>
<xml_diff>
--- a/Docker/Docker_Tutorial.pptx
+++ b/Docker/Docker_Tutorial.pptx
@@ -5,7 +5,7 @@
     <p:sldMasterId id="2147483648" r:id="rId1"/>
   </p:sldMasterIdLst>
   <p:notesMasterIdLst>
-    <p:notesMasterId r:id="rId14"/>
+    <p:notesMasterId r:id="rId18"/>
   </p:notesMasterIdLst>
   <p:sldIdLst>
     <p:sldId id="256" r:id="rId2"/>
@@ -19,7 +19,11 @@
     <p:sldId id="261" r:id="rId10"/>
     <p:sldId id="267" r:id="rId11"/>
     <p:sldId id="268" r:id="rId12"/>
-    <p:sldId id="262" r:id="rId13"/>
+    <p:sldId id="269" r:id="rId13"/>
+    <p:sldId id="270" r:id="rId14"/>
+    <p:sldId id="271" r:id="rId15"/>
+    <p:sldId id="272" r:id="rId16"/>
+    <p:sldId id="273" r:id="rId17"/>
   </p:sldIdLst>
   <p:sldSz cx="9144000" cy="6858000" type="screen4x3"/>
   <p:notesSz cx="6858000" cy="9144000"/>
@@ -203,7 +207,7 @@
           <a:p>
             <a:fld id="{4C32271A-8C73-4D86-BAB6-7E0DDB3CE906}" type="datetimeFigureOut">
               <a:rPr lang="en-US" smtClean="0"/>
-              <a:t>7/25/2017</a:t>
+              <a:t>7/28/2017</a:t>
             </a:fld>
             <a:endParaRPr lang="en-US"/>
           </a:p>
@@ -717,6 +721,174 @@
 </p:notes>
 </file>
 
+<file path=ppt/notesSlides/notesSlide3.xml><?xml version="1.0" encoding="utf-8"?>
+<p:notes xmlns:a="http://schemas.openxmlformats.org/drawingml/2006/main" xmlns:r="http://schemas.openxmlformats.org/officeDocument/2006/relationships" xmlns:p="http://schemas.openxmlformats.org/presentationml/2006/main">
+  <p:cSld>
+    <p:spTree>
+      <p:nvGrpSpPr>
+        <p:cNvPr id="1" name=""/>
+        <p:cNvGrpSpPr/>
+        <p:nvPr/>
+      </p:nvGrpSpPr>
+      <p:grpSpPr>
+        <a:xfrm>
+          <a:off x="0" y="0"/>
+          <a:ext cx="0" cy="0"/>
+          <a:chOff x="0" y="0"/>
+          <a:chExt cx="0" cy="0"/>
+        </a:xfrm>
+      </p:grpSpPr>
+      <p:sp>
+        <p:nvSpPr>
+          <p:cNvPr id="2" name="Slide Image Placeholder 1"/>
+          <p:cNvSpPr>
+            <a:spLocks noGrp="1" noRot="1" noChangeAspect="1"/>
+          </p:cNvSpPr>
+          <p:nvPr>
+            <p:ph type="sldImg"/>
+          </p:nvPr>
+        </p:nvSpPr>
+        <p:spPr/>
+      </p:sp>
+      <p:sp>
+        <p:nvSpPr>
+          <p:cNvPr id="3" name="Notes Placeholder 2"/>
+          <p:cNvSpPr>
+            <a:spLocks noGrp="1"/>
+          </p:cNvSpPr>
+          <p:nvPr>
+            <p:ph type="body" idx="1"/>
+          </p:nvPr>
+        </p:nvSpPr>
+        <p:spPr/>
+        <p:txBody>
+          <a:bodyPr/>
+          <a:lstStyle/>
+          <a:p>
+            <a:endParaRPr lang="en-US" dirty="0"/>
+          </a:p>
+        </p:txBody>
+      </p:sp>
+      <p:sp>
+        <p:nvSpPr>
+          <p:cNvPr id="4" name="Slide Number Placeholder 3"/>
+          <p:cNvSpPr>
+            <a:spLocks noGrp="1"/>
+          </p:cNvSpPr>
+          <p:nvPr>
+            <p:ph type="sldNum" sz="quarter" idx="10"/>
+          </p:nvPr>
+        </p:nvSpPr>
+        <p:spPr/>
+        <p:txBody>
+          <a:bodyPr/>
+          <a:lstStyle/>
+          <a:p>
+            <a:fld id="{1D92E1DA-36CC-448F-BF8E-DCA58C2CD557}" type="slidenum">
+              <a:rPr lang="en-US" smtClean="0"/>
+              <a:t>12</a:t>
+            </a:fld>
+            <a:endParaRPr lang="en-US"/>
+          </a:p>
+        </p:txBody>
+      </p:sp>
+    </p:spTree>
+    <p:extLst>
+      <p:ext uri="{BB962C8B-B14F-4D97-AF65-F5344CB8AC3E}">
+        <p14:creationId xmlns:p14="http://schemas.microsoft.com/office/powerpoint/2010/main" val="433425733"/>
+      </p:ext>
+    </p:extLst>
+  </p:cSld>
+  <p:clrMapOvr>
+    <a:masterClrMapping/>
+  </p:clrMapOvr>
+</p:notes>
+</file>
+
+<file path=ppt/notesSlides/notesSlide4.xml><?xml version="1.0" encoding="utf-8"?>
+<p:notes xmlns:a="http://schemas.openxmlformats.org/drawingml/2006/main" xmlns:r="http://schemas.openxmlformats.org/officeDocument/2006/relationships" xmlns:p="http://schemas.openxmlformats.org/presentationml/2006/main">
+  <p:cSld>
+    <p:spTree>
+      <p:nvGrpSpPr>
+        <p:cNvPr id="1" name=""/>
+        <p:cNvGrpSpPr/>
+        <p:nvPr/>
+      </p:nvGrpSpPr>
+      <p:grpSpPr>
+        <a:xfrm>
+          <a:off x="0" y="0"/>
+          <a:ext cx="0" cy="0"/>
+          <a:chOff x="0" y="0"/>
+          <a:chExt cx="0" cy="0"/>
+        </a:xfrm>
+      </p:grpSpPr>
+      <p:sp>
+        <p:nvSpPr>
+          <p:cNvPr id="2" name="Slide Image Placeholder 1"/>
+          <p:cNvSpPr>
+            <a:spLocks noGrp="1" noRot="1" noChangeAspect="1"/>
+          </p:cNvSpPr>
+          <p:nvPr>
+            <p:ph type="sldImg"/>
+          </p:nvPr>
+        </p:nvSpPr>
+        <p:spPr/>
+      </p:sp>
+      <p:sp>
+        <p:nvSpPr>
+          <p:cNvPr id="3" name="Notes Placeholder 2"/>
+          <p:cNvSpPr>
+            <a:spLocks noGrp="1"/>
+          </p:cNvSpPr>
+          <p:nvPr>
+            <p:ph type="body" idx="1"/>
+          </p:nvPr>
+        </p:nvSpPr>
+        <p:spPr/>
+        <p:txBody>
+          <a:bodyPr/>
+          <a:lstStyle/>
+          <a:p>
+            <a:endParaRPr lang="en-US" dirty="0"/>
+          </a:p>
+        </p:txBody>
+      </p:sp>
+      <p:sp>
+        <p:nvSpPr>
+          <p:cNvPr id="4" name="Slide Number Placeholder 3"/>
+          <p:cNvSpPr>
+            <a:spLocks noGrp="1"/>
+          </p:cNvSpPr>
+          <p:nvPr>
+            <p:ph type="sldNum" sz="quarter" idx="10"/>
+          </p:nvPr>
+        </p:nvSpPr>
+        <p:spPr/>
+        <p:txBody>
+          <a:bodyPr/>
+          <a:lstStyle/>
+          <a:p>
+            <a:fld id="{1D92E1DA-36CC-448F-BF8E-DCA58C2CD557}" type="slidenum">
+              <a:rPr lang="en-US" smtClean="0"/>
+              <a:t>15</a:t>
+            </a:fld>
+            <a:endParaRPr lang="en-US"/>
+          </a:p>
+        </p:txBody>
+      </p:sp>
+    </p:spTree>
+    <p:extLst>
+      <p:ext uri="{BB962C8B-B14F-4D97-AF65-F5344CB8AC3E}">
+        <p14:creationId xmlns:p14="http://schemas.microsoft.com/office/powerpoint/2010/main" val="1161670294"/>
+      </p:ext>
+    </p:extLst>
+  </p:cSld>
+  <p:clrMapOvr>
+    <a:masterClrMapping/>
+  </p:clrMapOvr>
+</p:notes>
+</file>
+
 <file path=ppt/slideLayouts/slideLayout1.xml><?xml version="1.0" encoding="utf-8"?>
 <p:sldLayout xmlns:a="http://schemas.openxmlformats.org/drawingml/2006/main" xmlns:r="http://schemas.openxmlformats.org/officeDocument/2006/relationships" xmlns:p="http://schemas.openxmlformats.org/presentationml/2006/main" type="title" preserve="1">
   <p:cSld name="Title Slide">
@@ -898,7 +1070,7 @@
           <a:p>
             <a:fld id="{D8D5993A-BDE8-4DA1-A758-DF79A4A926A0}" type="datetimeFigureOut">
               <a:rPr lang="en-US" smtClean="0"/>
-              <a:t>7/25/2017</a:t>
+              <a:t>7/28/2017</a:t>
             </a:fld>
             <a:endParaRPr lang="en-US"/>
           </a:p>
@@ -1068,7 +1240,7 @@
           <a:p>
             <a:fld id="{D8D5993A-BDE8-4DA1-A758-DF79A4A926A0}" type="datetimeFigureOut">
               <a:rPr lang="en-US" smtClean="0"/>
-              <a:t>7/25/2017</a:t>
+              <a:t>7/28/2017</a:t>
             </a:fld>
             <a:endParaRPr lang="en-US"/>
           </a:p>
@@ -1248,7 +1420,7 @@
           <a:p>
             <a:fld id="{D8D5993A-BDE8-4DA1-A758-DF79A4A926A0}" type="datetimeFigureOut">
               <a:rPr lang="en-US" smtClean="0"/>
-              <a:t>7/25/2017</a:t>
+              <a:t>7/28/2017</a:t>
             </a:fld>
             <a:endParaRPr lang="en-US"/>
           </a:p>
@@ -1418,7 +1590,7 @@
           <a:p>
             <a:fld id="{D8D5993A-BDE8-4DA1-A758-DF79A4A926A0}" type="datetimeFigureOut">
               <a:rPr lang="en-US" smtClean="0"/>
-              <a:t>7/25/2017</a:t>
+              <a:t>7/28/2017</a:t>
             </a:fld>
             <a:endParaRPr lang="en-US"/>
           </a:p>
@@ -1664,7 +1836,7 @@
           <a:p>
             <a:fld id="{D8D5993A-BDE8-4DA1-A758-DF79A4A926A0}" type="datetimeFigureOut">
               <a:rPr lang="en-US" smtClean="0"/>
-              <a:t>7/25/2017</a:t>
+              <a:t>7/28/2017</a:t>
             </a:fld>
             <a:endParaRPr lang="en-US"/>
           </a:p>
@@ -1952,7 +2124,7 @@
           <a:p>
             <a:fld id="{D8D5993A-BDE8-4DA1-A758-DF79A4A926A0}" type="datetimeFigureOut">
               <a:rPr lang="en-US" smtClean="0"/>
-              <a:t>7/25/2017</a:t>
+              <a:t>7/28/2017</a:t>
             </a:fld>
             <a:endParaRPr lang="en-US"/>
           </a:p>
@@ -2374,7 +2546,7 @@
           <a:p>
             <a:fld id="{D8D5993A-BDE8-4DA1-A758-DF79A4A926A0}" type="datetimeFigureOut">
               <a:rPr lang="en-US" smtClean="0"/>
-              <a:t>7/25/2017</a:t>
+              <a:t>7/28/2017</a:t>
             </a:fld>
             <a:endParaRPr lang="en-US"/>
           </a:p>
@@ -2492,7 +2664,7 @@
           <a:p>
             <a:fld id="{D8D5993A-BDE8-4DA1-A758-DF79A4A926A0}" type="datetimeFigureOut">
               <a:rPr lang="en-US" smtClean="0"/>
-              <a:t>7/25/2017</a:t>
+              <a:t>7/28/2017</a:t>
             </a:fld>
             <a:endParaRPr lang="en-US"/>
           </a:p>
@@ -2587,7 +2759,7 @@
           <a:p>
             <a:fld id="{D8D5993A-BDE8-4DA1-A758-DF79A4A926A0}" type="datetimeFigureOut">
               <a:rPr lang="en-US" smtClean="0"/>
-              <a:t>7/25/2017</a:t>
+              <a:t>7/28/2017</a:t>
             </a:fld>
             <a:endParaRPr lang="en-US"/>
           </a:p>
@@ -2864,7 +3036,7 @@
           <a:p>
             <a:fld id="{D8D5993A-BDE8-4DA1-A758-DF79A4A926A0}" type="datetimeFigureOut">
               <a:rPr lang="en-US" smtClean="0"/>
-              <a:t>7/25/2017</a:t>
+              <a:t>7/28/2017</a:t>
             </a:fld>
             <a:endParaRPr lang="en-US"/>
           </a:p>
@@ -3117,7 +3289,7 @@
           <a:p>
             <a:fld id="{D8D5993A-BDE8-4DA1-A758-DF79A4A926A0}" type="datetimeFigureOut">
               <a:rPr lang="en-US" smtClean="0"/>
-              <a:t>7/25/2017</a:t>
+              <a:t>7/28/2017</a:t>
             </a:fld>
             <a:endParaRPr lang="en-US"/>
           </a:p>
@@ -3330,7 +3502,7 @@
           <a:p>
             <a:fld id="{D8D5993A-BDE8-4DA1-A758-DF79A4A926A0}" type="datetimeFigureOut">
               <a:rPr lang="en-US" smtClean="0"/>
-              <a:t>7/25/2017</a:t>
+              <a:t>7/28/2017</a:t>
             </a:fld>
             <a:endParaRPr lang="en-US"/>
           </a:p>
@@ -4913,29 +5085,2288 @@
           <a:chExt cx="0" cy="0"/>
         </a:xfrm>
       </p:grpSpPr>
+      <p:sp>
+        <p:nvSpPr>
+          <p:cNvPr id="2" name="TextBox 1"/>
+          <p:cNvSpPr txBox="1"/>
+          <p:nvPr/>
+        </p:nvSpPr>
+        <p:spPr>
+          <a:xfrm>
+            <a:off x="1066801" y="152400"/>
+            <a:ext cx="7391400" cy="646331"/>
+          </a:xfrm>
+          <a:prstGeom prst="rect">
+            <a:avLst/>
+          </a:prstGeom>
+          <a:noFill/>
+        </p:spPr>
+        <p:txBody>
+          <a:bodyPr wrap="square" rtlCol="0">
+            <a:spAutoFit/>
+          </a:bodyPr>
+          <a:lstStyle/>
+          <a:p>
+            <a:pPr algn="ctr"/>
+            <a:r>
+              <a:rPr lang="en-US" sz="3600" dirty="0" smtClean="0"/>
+              <a:t>Shared and Persistent Data</a:t>
+            </a:r>
+            <a:endParaRPr lang="en-US" sz="3600" dirty="0"/>
+          </a:p>
+        </p:txBody>
+      </p:sp>
+      <p:sp>
+        <p:nvSpPr>
+          <p:cNvPr id="4" name="TextBox 3"/>
+          <p:cNvSpPr txBox="1"/>
+          <p:nvPr/>
+        </p:nvSpPr>
+        <p:spPr>
+          <a:xfrm>
+            <a:off x="304800" y="798731"/>
+            <a:ext cx="8610599" cy="923330"/>
+          </a:xfrm>
+          <a:prstGeom prst="rect">
+            <a:avLst/>
+          </a:prstGeom>
+          <a:noFill/>
+        </p:spPr>
+        <p:txBody>
+          <a:bodyPr wrap="square" rtlCol="0">
+            <a:spAutoFit/>
+          </a:bodyPr>
+          <a:lstStyle/>
+          <a:p>
+            <a:pPr marL="342900" indent="-342900">
+              <a:buAutoNum type="arabicPeriod"/>
+            </a:pPr>
+            <a:r>
+              <a:rPr lang="en-US" dirty="0" smtClean="0"/>
+              <a:t>External DATA is Ideal – DATA ON HOST</a:t>
+            </a:r>
+            <a:endParaRPr lang="en-US" dirty="0" smtClean="0"/>
+          </a:p>
+          <a:p>
+            <a:pPr marL="342900" indent="-342900">
+              <a:buAutoNum type="arabicPeriod"/>
+            </a:pPr>
+            <a:r>
+              <a:rPr lang="en-US" dirty="0" smtClean="0"/>
+              <a:t>Mapping the External DATA with the Container</a:t>
+            </a:r>
+            <a:r>
+              <a:rPr lang="en-US" dirty="0" smtClean="0"/>
+              <a:t>.</a:t>
+            </a:r>
+          </a:p>
+          <a:p>
+            <a:endParaRPr lang="en-US" dirty="0" smtClean="0"/>
+          </a:p>
+        </p:txBody>
+      </p:sp>
+      <p:sp>
+        <p:nvSpPr>
+          <p:cNvPr id="10" name="TextBox 9"/>
+          <p:cNvSpPr txBox="1"/>
+          <p:nvPr/>
+        </p:nvSpPr>
+        <p:spPr>
+          <a:xfrm>
+            <a:off x="914400" y="2581870"/>
+            <a:ext cx="184731" cy="338554"/>
+          </a:xfrm>
+          <a:prstGeom prst="rect">
+            <a:avLst/>
+          </a:prstGeom>
+          <a:noFill/>
+        </p:spPr>
+        <p:txBody>
+          <a:bodyPr wrap="none" rtlCol="0">
+            <a:spAutoFit/>
+          </a:bodyPr>
+          <a:lstStyle/>
+          <a:p>
+            <a:endParaRPr lang="en-US" sz="1600" b="1" dirty="0"/>
+          </a:p>
+        </p:txBody>
+      </p:sp>
+      <p:grpSp>
+        <p:nvGrpSpPr>
+          <p:cNvPr id="21" name="Group 20"/>
+          <p:cNvGrpSpPr/>
+          <p:nvPr/>
+        </p:nvGrpSpPr>
+        <p:grpSpPr>
+          <a:xfrm>
+            <a:off x="997981" y="1456273"/>
+            <a:ext cx="6973625" cy="2196991"/>
+            <a:chOff x="997981" y="1652651"/>
+            <a:chExt cx="7250298" cy="2196991"/>
+          </a:xfrm>
+        </p:grpSpPr>
+        <p:sp>
+          <p:nvSpPr>
+            <p:cNvPr id="13" name="Rectangle 12"/>
+            <p:cNvSpPr/>
+            <p:nvPr/>
+          </p:nvSpPr>
+          <p:spPr>
+            <a:xfrm>
+              <a:off x="997981" y="2299623"/>
+              <a:ext cx="3124200" cy="1433622"/>
+            </a:xfrm>
+            <a:prstGeom prst="rect">
+              <a:avLst/>
+            </a:prstGeom>
+            <a:noFill/>
+          </p:spPr>
+          <p:style>
+            <a:lnRef idx="2">
+              <a:schemeClr val="accent1">
+                <a:shade val="50000"/>
+              </a:schemeClr>
+            </a:lnRef>
+            <a:fillRef idx="1">
+              <a:schemeClr val="accent1"/>
+            </a:fillRef>
+            <a:effectRef idx="0">
+              <a:schemeClr val="accent1"/>
+            </a:effectRef>
+            <a:fontRef idx="minor">
+              <a:schemeClr val="lt1"/>
+            </a:fontRef>
+          </p:style>
+          <p:txBody>
+            <a:bodyPr rtlCol="0" anchor="ctr"/>
+            <a:lstStyle/>
+            <a:p>
+              <a:pPr algn="ctr"/>
+              <a:endParaRPr lang="en-US"/>
+            </a:p>
+          </p:txBody>
+        </p:sp>
+        <p:sp>
+          <p:nvSpPr>
+            <p:cNvPr id="14" name="Flowchart: Process 13"/>
+            <p:cNvSpPr/>
+            <p:nvPr/>
+          </p:nvSpPr>
+          <p:spPr>
+            <a:xfrm>
+              <a:off x="1340881" y="1766223"/>
+              <a:ext cx="1219200" cy="533400"/>
+            </a:xfrm>
+            <a:prstGeom prst="flowChartProcess">
+              <a:avLst/>
+            </a:prstGeom>
+            <a:noFill/>
+          </p:spPr>
+          <p:style>
+            <a:lnRef idx="2">
+              <a:schemeClr val="accent1">
+                <a:shade val="50000"/>
+              </a:schemeClr>
+            </a:lnRef>
+            <a:fillRef idx="1">
+              <a:schemeClr val="accent1"/>
+            </a:fillRef>
+            <a:effectRef idx="0">
+              <a:schemeClr val="accent1"/>
+            </a:effectRef>
+            <a:fontRef idx="minor">
+              <a:schemeClr val="lt1"/>
+            </a:fontRef>
+          </p:style>
+          <p:txBody>
+            <a:bodyPr rtlCol="0" anchor="ctr"/>
+            <a:lstStyle/>
+            <a:p>
+              <a:pPr algn="ctr"/>
+              <a:endParaRPr lang="en-US"/>
+            </a:p>
+          </p:txBody>
+        </p:sp>
+        <p:sp>
+          <p:nvSpPr>
+            <p:cNvPr id="9" name="TextBox 8"/>
+            <p:cNvSpPr txBox="1"/>
+            <p:nvPr/>
+          </p:nvSpPr>
+          <p:spPr>
+            <a:xfrm>
+              <a:off x="1424462" y="1877479"/>
+              <a:ext cx="1052038" cy="369332"/>
+            </a:xfrm>
+            <a:prstGeom prst="rect">
+              <a:avLst/>
+            </a:prstGeom>
+            <a:noFill/>
+          </p:spPr>
+          <p:txBody>
+            <a:bodyPr wrap="square" rtlCol="0">
+              <a:spAutoFit/>
+            </a:bodyPr>
+            <a:lstStyle/>
+            <a:p>
+              <a:r>
+                <a:rPr lang="en-US" dirty="0" smtClean="0"/>
+                <a:t>HOST</a:t>
+              </a:r>
+              <a:endParaRPr lang="en-US" dirty="0"/>
+            </a:p>
+          </p:txBody>
+        </p:sp>
+        <p:grpSp>
+          <p:nvGrpSpPr>
+            <p:cNvPr id="15" name="Group 14"/>
+            <p:cNvGrpSpPr/>
+            <p:nvPr/>
+          </p:nvGrpSpPr>
+          <p:grpSpPr>
+            <a:xfrm>
+              <a:off x="5642718" y="1722061"/>
+              <a:ext cx="2605561" cy="1997561"/>
+              <a:chOff x="1946177" y="3768650"/>
+              <a:chExt cx="2605561" cy="1997561"/>
+            </a:xfrm>
+          </p:grpSpPr>
+          <p:sp>
+            <p:nvSpPr>
+              <p:cNvPr id="6" name="Flowchart: Process 5"/>
+              <p:cNvSpPr/>
+              <p:nvPr/>
+            </p:nvSpPr>
+            <p:spPr>
+              <a:xfrm>
+                <a:off x="2123612" y="3768650"/>
+                <a:ext cx="1723846" cy="557381"/>
+              </a:xfrm>
+              <a:prstGeom prst="flowChartProcess">
+                <a:avLst/>
+              </a:prstGeom>
+              <a:noFill/>
+            </p:spPr>
+            <p:style>
+              <a:lnRef idx="2">
+                <a:schemeClr val="accent1">
+                  <a:shade val="50000"/>
+                </a:schemeClr>
+              </a:lnRef>
+              <a:fillRef idx="1">
+                <a:schemeClr val="accent1"/>
+              </a:fillRef>
+              <a:effectRef idx="0">
+                <a:schemeClr val="accent1"/>
+              </a:effectRef>
+              <a:fontRef idx="minor">
+                <a:schemeClr val="lt1"/>
+              </a:fontRef>
+            </p:style>
+            <p:txBody>
+              <a:bodyPr rtlCol="0" anchor="ctr"/>
+              <a:lstStyle/>
+              <a:p>
+                <a:pPr algn="ctr"/>
+                <a:endParaRPr lang="en-US"/>
+              </a:p>
+            </p:txBody>
+          </p:sp>
+          <p:sp>
+            <p:nvSpPr>
+              <p:cNvPr id="8" name="Rectangle 7"/>
+              <p:cNvSpPr/>
+              <p:nvPr/>
+            </p:nvSpPr>
+            <p:spPr>
+              <a:xfrm>
+                <a:off x="1946177" y="4318411"/>
+                <a:ext cx="2605561" cy="1447800"/>
+              </a:xfrm>
+              <a:prstGeom prst="rect">
+                <a:avLst/>
+              </a:prstGeom>
+              <a:noFill/>
+            </p:spPr>
+            <p:style>
+              <a:lnRef idx="2">
+                <a:schemeClr val="accent1">
+                  <a:shade val="50000"/>
+                </a:schemeClr>
+              </a:lnRef>
+              <a:fillRef idx="1">
+                <a:schemeClr val="accent1"/>
+              </a:fillRef>
+              <a:effectRef idx="0">
+                <a:schemeClr val="accent1"/>
+              </a:effectRef>
+              <a:fontRef idx="minor">
+                <a:schemeClr val="lt1"/>
+              </a:fontRef>
+            </p:style>
+            <p:txBody>
+              <a:bodyPr rtlCol="0" anchor="ctr"/>
+              <a:lstStyle/>
+              <a:p>
+                <a:pPr algn="ctr"/>
+                <a:endParaRPr lang="en-US"/>
+              </a:p>
+            </p:txBody>
+          </p:sp>
+          <p:sp>
+            <p:nvSpPr>
+              <p:cNvPr id="11" name="TextBox 10"/>
+              <p:cNvSpPr txBox="1"/>
+              <p:nvPr/>
+            </p:nvSpPr>
+            <p:spPr>
+              <a:xfrm>
+                <a:off x="2118875" y="3877914"/>
+                <a:ext cx="1652184" cy="369332"/>
+              </a:xfrm>
+              <a:prstGeom prst="rect">
+                <a:avLst/>
+              </a:prstGeom>
+              <a:noFill/>
+            </p:spPr>
+            <p:txBody>
+              <a:bodyPr wrap="none" rtlCol="0">
+                <a:spAutoFit/>
+              </a:bodyPr>
+              <a:lstStyle/>
+              <a:p>
+                <a:r>
+                  <a:rPr lang="en-US" dirty="0" smtClean="0"/>
+                  <a:t>DK. CONTAINER</a:t>
+                </a:r>
+                <a:endParaRPr lang="en-US" dirty="0"/>
+              </a:p>
+            </p:txBody>
+          </p:sp>
+          <p:sp>
+            <p:nvSpPr>
+              <p:cNvPr id="12" name="TextBox 11"/>
+              <p:cNvSpPr txBox="1"/>
+              <p:nvPr/>
+            </p:nvSpPr>
+            <p:spPr>
+              <a:xfrm>
+                <a:off x="2232535" y="4642499"/>
+                <a:ext cx="184731" cy="369332"/>
+              </a:xfrm>
+              <a:prstGeom prst="rect">
+                <a:avLst/>
+              </a:prstGeom>
+              <a:noFill/>
+            </p:spPr>
+            <p:txBody>
+              <a:bodyPr wrap="none" rtlCol="0">
+                <a:spAutoFit/>
+              </a:bodyPr>
+              <a:lstStyle/>
+              <a:p>
+                <a:endParaRPr lang="en-US" dirty="0"/>
+              </a:p>
+            </p:txBody>
+          </p:sp>
+        </p:grpSp>
+        <p:sp>
+          <p:nvSpPr>
+            <p:cNvPr id="16" name="TextBox 15"/>
+            <p:cNvSpPr txBox="1"/>
+            <p:nvPr/>
+          </p:nvSpPr>
+          <p:spPr>
+            <a:xfrm>
+              <a:off x="1148875" y="2811056"/>
+              <a:ext cx="1710533" cy="369332"/>
+            </a:xfrm>
+            <a:prstGeom prst="rect">
+              <a:avLst/>
+            </a:prstGeom>
+            <a:noFill/>
+          </p:spPr>
+          <p:txBody>
+            <a:bodyPr wrap="none" rtlCol="0">
+              <a:spAutoFit/>
+            </a:bodyPr>
+            <a:lstStyle/>
+            <a:p>
+              <a:r>
+                <a:rPr lang="en-US" dirty="0" smtClean="0"/>
+                <a:t>/HOST/…../DATA</a:t>
+              </a:r>
+              <a:endParaRPr lang="en-US" dirty="0"/>
+            </a:p>
+          </p:txBody>
+        </p:sp>
+        <p:sp>
+          <p:nvSpPr>
+            <p:cNvPr id="17" name="TextBox 16"/>
+            <p:cNvSpPr txBox="1"/>
+            <p:nvPr/>
+          </p:nvSpPr>
+          <p:spPr>
+            <a:xfrm>
+              <a:off x="5820153" y="2672556"/>
+              <a:ext cx="2151453" cy="646331"/>
+            </a:xfrm>
+            <a:prstGeom prst="rect">
+              <a:avLst/>
+            </a:prstGeom>
+            <a:noFill/>
+          </p:spPr>
+          <p:txBody>
+            <a:bodyPr wrap="square" rtlCol="0">
+              <a:spAutoFit/>
+            </a:bodyPr>
+            <a:lstStyle/>
+            <a:p>
+              <a:r>
+                <a:rPr lang="en-US" dirty="0" smtClean="0"/>
+                <a:t>/THE/DIRECTORY/YOU/DESIRE</a:t>
+              </a:r>
+              <a:endParaRPr lang="en-US" dirty="0"/>
+            </a:p>
+          </p:txBody>
+        </p:sp>
+        <p:sp>
+          <p:nvSpPr>
+            <p:cNvPr id="18" name="Circular Arrow 17"/>
+            <p:cNvSpPr/>
+            <p:nvPr/>
+          </p:nvSpPr>
+          <p:spPr>
+            <a:xfrm>
+              <a:off x="3599207" y="1652651"/>
+              <a:ext cx="2514600" cy="2196991"/>
+            </a:xfrm>
+            <a:prstGeom prst="circularArrow">
+              <a:avLst>
+                <a:gd name="adj1" fmla="val 12500"/>
+                <a:gd name="adj2" fmla="val 1142319"/>
+                <a:gd name="adj3" fmla="val 20457681"/>
+                <a:gd name="adj4" fmla="val 10799999"/>
+                <a:gd name="adj5" fmla="val 12500"/>
+              </a:avLst>
+            </a:prstGeom>
+          </p:spPr>
+          <p:style>
+            <a:lnRef idx="2">
+              <a:schemeClr val="accent1">
+                <a:shade val="50000"/>
+              </a:schemeClr>
+            </a:lnRef>
+            <a:fillRef idx="1">
+              <a:schemeClr val="accent1"/>
+            </a:fillRef>
+            <a:effectRef idx="0">
+              <a:schemeClr val="accent1"/>
+            </a:effectRef>
+            <a:fontRef idx="minor">
+              <a:schemeClr val="lt1"/>
+            </a:fontRef>
+          </p:style>
+          <p:txBody>
+            <a:bodyPr rtlCol="0" anchor="ctr"/>
+            <a:lstStyle/>
+            <a:p>
+              <a:pPr algn="ctr"/>
+              <a:endParaRPr lang="en-US">
+                <a:solidFill>
+                  <a:schemeClr val="tx1"/>
+                </a:solidFill>
+              </a:endParaRPr>
+            </a:p>
+          </p:txBody>
+        </p:sp>
+        <p:sp>
+          <p:nvSpPr>
+            <p:cNvPr id="19" name="TextBox 18"/>
+            <p:cNvSpPr txBox="1"/>
+            <p:nvPr/>
+          </p:nvSpPr>
+          <p:spPr>
+            <a:xfrm>
+              <a:off x="4419600" y="2554769"/>
+              <a:ext cx="1223118" cy="923330"/>
+            </a:xfrm>
+            <a:prstGeom prst="rect">
+              <a:avLst/>
+            </a:prstGeom>
+            <a:noFill/>
+          </p:spPr>
+          <p:txBody>
+            <a:bodyPr wrap="square" rtlCol="0">
+              <a:spAutoFit/>
+            </a:bodyPr>
+            <a:lstStyle/>
+            <a:p>
+              <a:r>
+                <a:rPr lang="en-US" dirty="0" smtClean="0"/>
+                <a:t>External DATA MAPPING</a:t>
+              </a:r>
+              <a:endParaRPr lang="en-US" dirty="0"/>
+            </a:p>
+          </p:txBody>
+        </p:sp>
+      </p:grpSp>
+      <p:sp>
+        <p:nvSpPr>
+          <p:cNvPr id="20" name="TextBox 19"/>
+          <p:cNvSpPr txBox="1"/>
+          <p:nvPr/>
+        </p:nvSpPr>
+        <p:spPr>
+          <a:xfrm>
+            <a:off x="194129" y="3639532"/>
+            <a:ext cx="8797471" cy="2862322"/>
+          </a:xfrm>
+          <a:prstGeom prst="rect">
+            <a:avLst/>
+          </a:prstGeom>
+          <a:noFill/>
+        </p:spPr>
+        <p:txBody>
+          <a:bodyPr wrap="square" rtlCol="0">
+            <a:spAutoFit/>
+          </a:bodyPr>
+          <a:lstStyle/>
+          <a:p>
+            <a:r>
+              <a:rPr lang="en-US" dirty="0" smtClean="0"/>
+              <a:t>The command is SIMPLE</a:t>
+            </a:r>
+          </a:p>
+          <a:p>
+            <a:r>
+              <a:rPr lang="en-US" b="1" i="1" dirty="0"/>
+              <a:t>$ </a:t>
+            </a:r>
+            <a:r>
+              <a:rPr lang="en-US" b="1" i="1" dirty="0" err="1"/>
+              <a:t>sudo</a:t>
+            </a:r>
+            <a:r>
+              <a:rPr lang="en-US" b="1" i="1" dirty="0"/>
+              <a:t> </a:t>
+            </a:r>
+            <a:r>
+              <a:rPr lang="en-US" b="1" i="1" dirty="0" err="1"/>
+              <a:t>docker</a:t>
+            </a:r>
+            <a:r>
+              <a:rPr lang="en-US" b="1" i="1" dirty="0"/>
+              <a:t> run –d </a:t>
+            </a:r>
+            <a:r>
+              <a:rPr lang="en-US" b="1" i="1" dirty="0"/>
+              <a:t>–v </a:t>
+            </a:r>
+            <a:r>
+              <a:rPr lang="en-US" b="1" i="1" dirty="0"/>
+              <a:t>/HOST/…../</a:t>
+            </a:r>
+            <a:r>
+              <a:rPr lang="en-US" b="1" i="1" dirty="0" smtClean="0"/>
+              <a:t>DATA:/</a:t>
+            </a:r>
+            <a:r>
+              <a:rPr lang="en-US" b="1" i="1" dirty="0"/>
+              <a:t>CONTAINER/LOCATION </a:t>
+            </a:r>
+            <a:r>
+              <a:rPr lang="en-US" dirty="0"/>
+              <a:t>(</a:t>
+            </a:r>
+            <a:r>
+              <a:rPr lang="en-US" i="1" dirty="0"/>
+              <a:t>Note</a:t>
+            </a:r>
+            <a:r>
+              <a:rPr lang="en-US" dirty="0"/>
+              <a:t>:</a:t>
+            </a:r>
+            <a:r>
+              <a:rPr lang="en-US" b="1" i="1" dirty="0"/>
+              <a:t> </a:t>
+            </a:r>
+            <a:r>
+              <a:rPr lang="en-US" dirty="0" smtClean="0"/>
+              <a:t>-v </a:t>
+            </a:r>
+            <a:r>
+              <a:rPr lang="en-US" dirty="0"/>
+              <a:t>stand for </a:t>
+            </a:r>
+            <a:r>
+              <a:rPr lang="en-US" dirty="0" smtClean="0"/>
+              <a:t>share volume)</a:t>
+            </a:r>
+          </a:p>
+          <a:p>
+            <a:r>
+              <a:rPr lang="en-US" dirty="0" smtClean="0"/>
+              <a:t>Practice </a:t>
+            </a:r>
+            <a:r>
+              <a:rPr lang="en-US" dirty="0" err="1" smtClean="0"/>
+              <a:t>Example:We</a:t>
+            </a:r>
+            <a:r>
+              <a:rPr lang="en-US" dirty="0" smtClean="0"/>
+              <a:t> shall use NGINX image which is a simple webserver</a:t>
+            </a:r>
+          </a:p>
+          <a:p>
+            <a:r>
+              <a:rPr lang="en-US" b="1" dirty="0" smtClean="0">
+                <a:solidFill>
+                  <a:srgbClr val="C00000"/>
+                </a:solidFill>
+              </a:rPr>
+              <a:t>Step 1</a:t>
+            </a:r>
+            <a:r>
+              <a:rPr lang="en-US" b="1" dirty="0">
+                <a:solidFill>
+                  <a:srgbClr val="C00000"/>
+                </a:solidFill>
+              </a:rPr>
+              <a:t>: </a:t>
+            </a:r>
+            <a:r>
+              <a:rPr lang="en-US" dirty="0" smtClean="0"/>
+              <a:t>First RUN the NGINX </a:t>
+            </a:r>
+            <a:r>
+              <a:rPr lang="en-US" dirty="0" err="1" smtClean="0"/>
+              <a:t>conatianer</a:t>
+            </a:r>
+            <a:r>
+              <a:rPr lang="en-US" dirty="0" smtClean="0"/>
+              <a:t> inspect the IP and check the data on host browser.</a:t>
+            </a:r>
+          </a:p>
+          <a:p>
+            <a:r>
+              <a:rPr lang="en-US" b="1" dirty="0">
+                <a:solidFill>
+                  <a:srgbClr val="C00000"/>
+                </a:solidFill>
+              </a:rPr>
+              <a:t>Step 2: </a:t>
+            </a:r>
+            <a:r>
+              <a:rPr lang="en-US" dirty="0" smtClean="0"/>
+              <a:t>Create an index.html file on HOST MACHINE </a:t>
+            </a:r>
+            <a:endParaRPr lang="en-US" dirty="0"/>
+          </a:p>
+          <a:p>
+            <a:r>
+              <a:rPr lang="en-US" b="1" dirty="0">
+                <a:solidFill>
+                  <a:srgbClr val="C00000"/>
+                </a:solidFill>
+              </a:rPr>
+              <a:t>Step 3: </a:t>
+            </a:r>
+            <a:r>
+              <a:rPr lang="en-US" dirty="0"/>
+              <a:t>Using the command </a:t>
+            </a:r>
+            <a:r>
+              <a:rPr lang="en-US" dirty="0" smtClean="0"/>
+              <a:t>above, map the HOST LOCATION to this NGINX container /</a:t>
+            </a:r>
+            <a:r>
+              <a:rPr lang="en-US" dirty="0" err="1" smtClean="0"/>
+              <a:t>usr</a:t>
+            </a:r>
+            <a:r>
+              <a:rPr lang="en-US" dirty="0" smtClean="0"/>
+              <a:t>/share/</a:t>
+            </a:r>
+            <a:r>
+              <a:rPr lang="en-US" dirty="0" err="1" smtClean="0"/>
+              <a:t>nginx</a:t>
+            </a:r>
+            <a:r>
+              <a:rPr lang="en-US" dirty="0" smtClean="0"/>
+              <a:t>/html</a:t>
+            </a:r>
+          </a:p>
+          <a:p>
+            <a:r>
+              <a:rPr lang="en-US" b="1" dirty="0">
+                <a:solidFill>
+                  <a:srgbClr val="C00000"/>
+                </a:solidFill>
+              </a:rPr>
+              <a:t>Step 4: </a:t>
+            </a:r>
+            <a:r>
+              <a:rPr lang="en-US" dirty="0" smtClean="0"/>
+              <a:t>Inspect the newly started NGINX container with MAPED DATA and you find the data reflecting in the browser. </a:t>
+            </a:r>
+            <a:endParaRPr lang="en-US" dirty="0"/>
+          </a:p>
+        </p:txBody>
+      </p:sp>
+    </p:spTree>
+    <p:extLst>
+      <p:ext uri="{BB962C8B-B14F-4D97-AF65-F5344CB8AC3E}">
+        <p14:creationId xmlns:p14="http://schemas.microsoft.com/office/powerpoint/2010/main" val="2365017451"/>
+      </p:ext>
+    </p:extLst>
+  </p:cSld>
+  <p:clrMapOvr>
+    <a:masterClrMapping/>
+  </p:clrMapOvr>
+  <p:timing>
+    <p:tnLst>
+      <p:par>
+        <p:cTn id="1" dur="indefinite" restart="never" nodeType="tmRoot"/>
+      </p:par>
+    </p:tnLst>
+  </p:timing>
+</p:sld>
+</file>
+
+<file path=ppt/slides/slide13.xml><?xml version="1.0" encoding="utf-8"?>
+<p:sld xmlns:a="http://schemas.openxmlformats.org/drawingml/2006/main" xmlns:r="http://schemas.openxmlformats.org/officeDocument/2006/relationships" xmlns:p="http://schemas.openxmlformats.org/presentationml/2006/main">
+  <p:cSld>
+    <p:spTree>
+      <p:nvGrpSpPr>
+        <p:cNvPr id="1" name=""/>
+        <p:cNvGrpSpPr/>
+        <p:nvPr/>
+      </p:nvGrpSpPr>
+      <p:grpSpPr>
+        <a:xfrm>
+          <a:off x="0" y="0"/>
+          <a:ext cx="0" cy="0"/>
+          <a:chOff x="0" y="0"/>
+          <a:chExt cx="0" cy="0"/>
+        </a:xfrm>
+      </p:grpSpPr>
+      <p:sp>
+        <p:nvSpPr>
+          <p:cNvPr id="2" name="TextBox 1"/>
+          <p:cNvSpPr txBox="1"/>
+          <p:nvPr/>
+        </p:nvSpPr>
+        <p:spPr>
+          <a:xfrm>
+            <a:off x="212272" y="152400"/>
+            <a:ext cx="8703128" cy="646331"/>
+          </a:xfrm>
+          <a:prstGeom prst="rect">
+            <a:avLst/>
+          </a:prstGeom>
+          <a:noFill/>
+        </p:spPr>
+        <p:txBody>
+          <a:bodyPr wrap="square" rtlCol="0">
+            <a:spAutoFit/>
+          </a:bodyPr>
+          <a:lstStyle/>
+          <a:p>
+            <a:pPr algn="ctr"/>
+            <a:r>
+              <a:rPr lang="en-US" sz="3600" dirty="0" smtClean="0"/>
+              <a:t>Modifying Containers and Hence New Image</a:t>
+            </a:r>
+            <a:endParaRPr lang="en-US" sz="3600" dirty="0"/>
+          </a:p>
+        </p:txBody>
+      </p:sp>
+      <p:sp>
+        <p:nvSpPr>
+          <p:cNvPr id="3" name="Rectangle 2"/>
+          <p:cNvSpPr/>
+          <p:nvPr/>
+        </p:nvSpPr>
+        <p:spPr>
+          <a:xfrm>
+            <a:off x="212272" y="798731"/>
+            <a:ext cx="8779328" cy="6001643"/>
+          </a:xfrm>
+          <a:prstGeom prst="rect">
+            <a:avLst/>
+          </a:prstGeom>
+        </p:spPr>
+        <p:txBody>
+          <a:bodyPr wrap="square">
+            <a:spAutoFit/>
+          </a:bodyPr>
+          <a:lstStyle/>
+          <a:p>
+            <a:r>
+              <a:rPr lang="en-US" dirty="0" smtClean="0"/>
+              <a:t>1. </a:t>
+            </a:r>
+            <a:r>
+              <a:rPr lang="en-US" dirty="0"/>
+              <a:t>Attaching to running containers</a:t>
+            </a:r>
+          </a:p>
+          <a:p>
+            <a:r>
+              <a:rPr lang="en-US" dirty="0" smtClean="0"/>
+              <a:t>2. </a:t>
+            </a:r>
+            <a:r>
+              <a:rPr lang="en-US" dirty="0"/>
+              <a:t>Modifying Image</a:t>
+            </a:r>
+          </a:p>
+          <a:p>
+            <a:r>
+              <a:rPr lang="en-US" dirty="0" smtClean="0"/>
+              <a:t>3.Creating New Image</a:t>
+            </a:r>
+          </a:p>
+          <a:p>
+            <a:r>
+              <a:rPr lang="en-US" b="1" dirty="0">
+                <a:solidFill>
+                  <a:srgbClr val="C00000"/>
+                </a:solidFill>
+              </a:rPr>
+              <a:t>Step 1: </a:t>
+            </a:r>
+            <a:r>
+              <a:rPr lang="en-US" dirty="0"/>
+              <a:t>Run the container for mapping the </a:t>
+            </a:r>
+            <a:r>
+              <a:rPr lang="en-US" dirty="0" smtClean="0"/>
+              <a:t>port..</a:t>
+            </a:r>
+          </a:p>
+          <a:p>
+            <a:r>
+              <a:rPr lang="en-US" b="1" i="1" dirty="0"/>
+              <a:t>$ </a:t>
+            </a:r>
+            <a:r>
+              <a:rPr lang="en-US" b="1" i="1" dirty="0" err="1"/>
+              <a:t>sudo</a:t>
+            </a:r>
+            <a:r>
+              <a:rPr lang="en-US" b="1" i="1" dirty="0"/>
+              <a:t> </a:t>
+            </a:r>
+            <a:r>
+              <a:rPr lang="en-US" b="1" i="1" dirty="0" err="1"/>
+              <a:t>docker</a:t>
+            </a:r>
+            <a:r>
+              <a:rPr lang="en-US" b="1" i="1" dirty="0"/>
+              <a:t> run –d </a:t>
+            </a:r>
+            <a:r>
+              <a:rPr lang="en-US" b="1" i="1" dirty="0" smtClean="0"/>
+              <a:t>–name </a:t>
+            </a:r>
+            <a:r>
+              <a:rPr lang="en-US" b="1" i="1" dirty="0" err="1" smtClean="0"/>
+              <a:t>temp_container</a:t>
+            </a:r>
+            <a:r>
+              <a:rPr lang="en-US" b="1" i="1" dirty="0" smtClean="0"/>
+              <a:t> </a:t>
+            </a:r>
+            <a:r>
+              <a:rPr lang="en-US" b="1" i="1" dirty="0" err="1" smtClean="0"/>
+              <a:t>nginx</a:t>
+            </a:r>
+            <a:r>
+              <a:rPr lang="en-US" b="1" i="1" dirty="0" smtClean="0"/>
+              <a:t> </a:t>
+            </a:r>
+            <a:r>
+              <a:rPr lang="en-US" dirty="0"/>
+              <a:t>(</a:t>
+            </a:r>
+            <a:r>
+              <a:rPr lang="en-US" i="1" dirty="0"/>
+              <a:t>Note</a:t>
+            </a:r>
+            <a:r>
+              <a:rPr lang="en-US" dirty="0"/>
+              <a:t>:</a:t>
+            </a:r>
+            <a:r>
+              <a:rPr lang="en-US" b="1" i="1" dirty="0"/>
+              <a:t> </a:t>
+            </a:r>
+            <a:r>
+              <a:rPr lang="en-US" dirty="0" smtClean="0"/>
+              <a:t>--name flag to give your name to container)</a:t>
+            </a:r>
+          </a:p>
+          <a:p>
+            <a:r>
+              <a:rPr lang="en-US" b="1" dirty="0">
+                <a:solidFill>
+                  <a:srgbClr val="C00000"/>
+                </a:solidFill>
+              </a:rPr>
+              <a:t>Step 2: </a:t>
+            </a:r>
+            <a:r>
+              <a:rPr lang="en-US" dirty="0" smtClean="0"/>
+              <a:t>Now to enter the container. Use the command below.</a:t>
+            </a:r>
+            <a:endParaRPr lang="en-US" dirty="0"/>
+          </a:p>
+          <a:p>
+            <a:r>
+              <a:rPr lang="en-US" b="1" i="1" dirty="0"/>
+              <a:t>$ </a:t>
+            </a:r>
+            <a:r>
+              <a:rPr lang="en-US" b="1" i="1" dirty="0" err="1"/>
+              <a:t>sudo</a:t>
+            </a:r>
+            <a:r>
+              <a:rPr lang="en-US" b="1" i="1" dirty="0"/>
+              <a:t> </a:t>
+            </a:r>
+            <a:r>
+              <a:rPr lang="en-US" b="1" i="1" dirty="0" err="1"/>
+              <a:t>docker</a:t>
+            </a:r>
+            <a:r>
+              <a:rPr lang="en-US" b="1" i="1" dirty="0"/>
+              <a:t> </a:t>
+            </a:r>
+            <a:r>
+              <a:rPr lang="en-US" b="1" i="1" dirty="0" smtClean="0"/>
+              <a:t>exec -</a:t>
+            </a:r>
+            <a:r>
+              <a:rPr lang="en-US" b="1" i="1" dirty="0" err="1" smtClean="0"/>
+              <a:t>i</a:t>
+            </a:r>
+            <a:r>
+              <a:rPr lang="en-US" b="1" i="1" dirty="0" smtClean="0"/>
+              <a:t> -t </a:t>
+            </a:r>
+            <a:r>
+              <a:rPr lang="en-US" b="1" i="1" dirty="0"/>
+              <a:t>&lt;</a:t>
+            </a:r>
+            <a:r>
+              <a:rPr lang="en-US" b="1" i="1" dirty="0" err="1"/>
+              <a:t>Cont.Name</a:t>
+            </a:r>
+            <a:r>
+              <a:rPr lang="en-US" b="1" i="1" dirty="0"/>
+              <a:t> or Cont.ID</a:t>
+            </a:r>
+            <a:r>
+              <a:rPr lang="en-US" b="1" i="1" dirty="0" smtClean="0"/>
+              <a:t>&gt; bash</a:t>
+            </a:r>
+            <a:r>
+              <a:rPr lang="en-US" dirty="0" smtClean="0"/>
+              <a:t> (</a:t>
+            </a:r>
+            <a:r>
+              <a:rPr lang="en-US" i="1" dirty="0"/>
+              <a:t>Note</a:t>
+            </a:r>
+            <a:r>
+              <a:rPr lang="en-US" dirty="0"/>
+              <a:t>:</a:t>
+            </a:r>
+            <a:r>
+              <a:rPr lang="en-US" b="1" i="1" dirty="0"/>
+              <a:t> </a:t>
+            </a:r>
+            <a:r>
+              <a:rPr lang="en-US" dirty="0" smtClean="0"/>
+              <a:t>-</a:t>
+            </a:r>
+            <a:r>
+              <a:rPr lang="en-US" dirty="0" err="1" smtClean="0"/>
+              <a:t>i</a:t>
+            </a:r>
+            <a:r>
+              <a:rPr lang="en-US" dirty="0" smtClean="0"/>
+              <a:t> and –t flags stand for interactive and terminal respectively and </a:t>
+            </a:r>
+            <a:r>
+              <a:rPr lang="en-US" b="1" i="1" dirty="0" smtClean="0"/>
+              <a:t>bash is the command that we want to run under that terminal</a:t>
+            </a:r>
+            <a:r>
+              <a:rPr lang="en-US" dirty="0" smtClean="0"/>
+              <a:t>)</a:t>
+            </a:r>
+          </a:p>
+          <a:p>
+            <a:r>
+              <a:rPr lang="en-US" b="1" i="1" dirty="0" smtClean="0"/>
+              <a:t>You would now be INSIDE that container.</a:t>
+            </a:r>
+          </a:p>
+          <a:p>
+            <a:r>
+              <a:rPr lang="en-US" b="1" i="1" dirty="0" smtClean="0"/>
+              <a:t>root@</a:t>
+            </a:r>
+            <a:r>
+              <a:rPr lang="en-US" b="1" i="1" dirty="0"/>
+              <a:t> </a:t>
+            </a:r>
+            <a:r>
+              <a:rPr lang="en-US" b="1" i="1" dirty="0" smtClean="0"/>
+              <a:t>&lt;Cont.ID&gt;</a:t>
+            </a:r>
+            <a:r>
+              <a:rPr lang="en-US" b="1" i="1" dirty="0"/>
+              <a:t> </a:t>
+            </a:r>
+            <a:r>
+              <a:rPr lang="en-US" b="1" i="1" dirty="0" smtClean="0"/>
+              <a:t>$ </a:t>
+            </a:r>
+          </a:p>
+          <a:p>
+            <a:r>
+              <a:rPr lang="en-US" b="1" i="1" dirty="0" smtClean="0"/>
+              <a:t>Now here if you can change the content of  index.html under /</a:t>
+            </a:r>
+            <a:r>
+              <a:rPr lang="en-US" b="1" i="1" dirty="0" err="1" smtClean="0"/>
+              <a:t>usr</a:t>
+            </a:r>
+            <a:r>
+              <a:rPr lang="en-US" b="1" i="1" dirty="0" smtClean="0"/>
+              <a:t>/share/</a:t>
+            </a:r>
+            <a:r>
+              <a:rPr lang="en-US" b="1" i="1" dirty="0" err="1" smtClean="0"/>
+              <a:t>nginx</a:t>
+            </a:r>
+            <a:r>
+              <a:rPr lang="en-US" b="1" i="1" dirty="0" smtClean="0"/>
+              <a:t>/html</a:t>
+            </a:r>
+          </a:p>
+          <a:p>
+            <a:r>
+              <a:rPr lang="en-US" b="1" i="1" dirty="0"/>
+              <a:t>root@ &lt;Cont.ID&gt; </a:t>
+            </a:r>
+            <a:r>
+              <a:rPr lang="en-US" b="1" i="1" dirty="0" smtClean="0"/>
+              <a:t>:</a:t>
+            </a:r>
+            <a:r>
+              <a:rPr lang="en-US" b="1" i="1" dirty="0"/>
+              <a:t> /</a:t>
+            </a:r>
+            <a:r>
+              <a:rPr lang="en-US" b="1" i="1" dirty="0" err="1"/>
+              <a:t>usr</a:t>
+            </a:r>
+            <a:r>
+              <a:rPr lang="en-US" b="1" i="1" dirty="0"/>
+              <a:t>/share/</a:t>
+            </a:r>
+            <a:r>
+              <a:rPr lang="en-US" b="1" i="1" dirty="0" err="1"/>
+              <a:t>nginx</a:t>
+            </a:r>
+            <a:r>
+              <a:rPr lang="en-US" b="1" i="1" dirty="0"/>
+              <a:t>/html </a:t>
+            </a:r>
+            <a:r>
+              <a:rPr lang="en-US" b="1" i="1" dirty="0" smtClean="0"/>
+              <a:t>$ cat &gt; index.html</a:t>
+            </a:r>
+          </a:p>
+          <a:p>
+            <a:r>
+              <a:rPr lang="en-US" b="1" i="1" dirty="0" smtClean="0"/>
+              <a:t>&lt;h1&gt;CHANGED THE DATA&lt;/h1&gt;</a:t>
+            </a:r>
+          </a:p>
+          <a:p>
+            <a:r>
+              <a:rPr lang="en-US" b="1" i="1" dirty="0" smtClean="0"/>
+              <a:t>(</a:t>
+            </a:r>
+            <a:r>
+              <a:rPr lang="en-US" b="1" i="1" dirty="0" err="1" smtClean="0"/>
+              <a:t>ctrl+d</a:t>
+            </a:r>
+            <a:r>
+              <a:rPr lang="en-US" b="1" i="1" dirty="0" smtClean="0"/>
+              <a:t>) ---this would save the changed in index.html</a:t>
+            </a:r>
+            <a:endParaRPr lang="en-US" dirty="0"/>
+          </a:p>
+          <a:p>
+            <a:r>
+              <a:rPr lang="en-US" b="1" dirty="0" smtClean="0">
+                <a:solidFill>
+                  <a:srgbClr val="C00000"/>
+                </a:solidFill>
+              </a:rPr>
+              <a:t>Step 3: </a:t>
+            </a:r>
+            <a:r>
+              <a:rPr lang="en-US" dirty="0"/>
+              <a:t>N</a:t>
+            </a:r>
+            <a:r>
+              <a:rPr lang="en-US" dirty="0" smtClean="0"/>
+              <a:t>ow to create a New IMAGE with these changes as permanent.</a:t>
+            </a:r>
+          </a:p>
+          <a:p>
+            <a:r>
+              <a:rPr lang="en-US" dirty="0" smtClean="0"/>
+              <a:t>To do so, exit out of the running container to host. And follow the command below.</a:t>
+            </a:r>
+            <a:endParaRPr lang="en-US" dirty="0"/>
+          </a:p>
+          <a:p>
+            <a:r>
+              <a:rPr lang="en-US" b="1" i="1" dirty="0"/>
+              <a:t>$ </a:t>
+            </a:r>
+            <a:r>
+              <a:rPr lang="en-US" b="1" i="1" dirty="0" err="1"/>
+              <a:t>sudo</a:t>
+            </a:r>
+            <a:r>
+              <a:rPr lang="en-US" b="1" i="1" dirty="0"/>
+              <a:t> </a:t>
+            </a:r>
+            <a:r>
+              <a:rPr lang="en-US" b="1" i="1" dirty="0" err="1"/>
+              <a:t>docker</a:t>
+            </a:r>
+            <a:r>
+              <a:rPr lang="en-US" b="1" i="1" dirty="0"/>
+              <a:t> </a:t>
+            </a:r>
+            <a:r>
+              <a:rPr lang="en-US" b="1" i="1" dirty="0" smtClean="0"/>
+              <a:t>commit </a:t>
+            </a:r>
+            <a:r>
+              <a:rPr lang="en-US" b="1" i="1" dirty="0" err="1" smtClean="0"/>
+              <a:t>temp_container</a:t>
+            </a:r>
+            <a:r>
+              <a:rPr lang="en-US" b="1" i="1" dirty="0" smtClean="0"/>
+              <a:t> </a:t>
+            </a:r>
+            <a:r>
+              <a:rPr lang="en-US" b="1" i="1" dirty="0" err="1" smtClean="0"/>
+              <a:t>regenerated_nginx</a:t>
+            </a:r>
+            <a:r>
+              <a:rPr lang="en-US" b="1" i="1" dirty="0" smtClean="0"/>
+              <a:t> </a:t>
+            </a:r>
+          </a:p>
+          <a:p>
+            <a:r>
+              <a:rPr lang="en-US" b="1" i="1" dirty="0" err="1" smtClean="0"/>
+              <a:t>i.e</a:t>
+            </a:r>
+            <a:r>
+              <a:rPr lang="en-US" b="1" i="1" dirty="0" smtClean="0"/>
+              <a:t> </a:t>
+            </a:r>
+            <a:r>
+              <a:rPr lang="en-US" b="1" i="1" dirty="0"/>
+              <a:t>$ </a:t>
+            </a:r>
+            <a:r>
+              <a:rPr lang="en-US" b="1" i="1" dirty="0" err="1"/>
+              <a:t>sudo</a:t>
+            </a:r>
+            <a:r>
+              <a:rPr lang="en-US" b="1" i="1" dirty="0"/>
+              <a:t> </a:t>
+            </a:r>
+            <a:r>
+              <a:rPr lang="en-US" b="1" i="1" dirty="0" err="1"/>
+              <a:t>docker</a:t>
+            </a:r>
+            <a:r>
+              <a:rPr lang="en-US" b="1" i="1" dirty="0"/>
+              <a:t> commit </a:t>
+            </a:r>
+            <a:r>
+              <a:rPr lang="en-US" b="1" i="1" dirty="0" smtClean="0"/>
+              <a:t>&lt;Running </a:t>
+            </a:r>
+            <a:r>
+              <a:rPr lang="en-US" b="1" i="1" dirty="0" err="1" smtClean="0"/>
+              <a:t>Cont.Name</a:t>
+            </a:r>
+            <a:r>
+              <a:rPr lang="en-US" b="1" i="1" dirty="0" smtClean="0"/>
+              <a:t> with changes&gt; &lt;Name of the NEW IMAGE&gt; </a:t>
+            </a:r>
+            <a:endParaRPr lang="en-US" b="1" i="1" dirty="0"/>
+          </a:p>
+          <a:p>
+            <a:pPr algn="ctr"/>
+            <a:r>
+              <a:rPr lang="en-US" sz="2400" b="1" dirty="0" smtClean="0"/>
+              <a:t>LISTH DOCKER IMAGES AND YOU WOULD FIND AND NEW IMAGE</a:t>
+            </a:r>
+            <a:endParaRPr lang="en-US" sz="2400" b="1" dirty="0"/>
+          </a:p>
+        </p:txBody>
+      </p:sp>
+    </p:spTree>
+    <p:extLst>
+      <p:ext uri="{BB962C8B-B14F-4D97-AF65-F5344CB8AC3E}">
+        <p14:creationId xmlns:p14="http://schemas.microsoft.com/office/powerpoint/2010/main" val="1763623630"/>
+      </p:ext>
+    </p:extLst>
+  </p:cSld>
+  <p:clrMapOvr>
+    <a:masterClrMapping/>
+  </p:clrMapOvr>
+</p:sld>
+</file>
+
+<file path=ppt/slides/slide14.xml><?xml version="1.0" encoding="utf-8"?>
+<p:sld xmlns:a="http://schemas.openxmlformats.org/drawingml/2006/main" xmlns:r="http://schemas.openxmlformats.org/officeDocument/2006/relationships" xmlns:p="http://schemas.openxmlformats.org/presentationml/2006/main">
+  <p:cSld>
+    <p:spTree>
+      <p:nvGrpSpPr>
+        <p:cNvPr id="1" name=""/>
+        <p:cNvGrpSpPr/>
+        <p:nvPr/>
+      </p:nvGrpSpPr>
+      <p:grpSpPr>
+        <a:xfrm>
+          <a:off x="0" y="0"/>
+          <a:ext cx="0" cy="0"/>
+          <a:chOff x="0" y="0"/>
+          <a:chExt cx="0" cy="0"/>
+        </a:xfrm>
+      </p:grpSpPr>
+      <p:sp>
+        <p:nvSpPr>
+          <p:cNvPr id="2" name="TextBox 1"/>
+          <p:cNvSpPr txBox="1"/>
+          <p:nvPr/>
+        </p:nvSpPr>
+        <p:spPr>
+          <a:xfrm>
+            <a:off x="212272" y="152400"/>
+            <a:ext cx="8703128" cy="646331"/>
+          </a:xfrm>
+          <a:prstGeom prst="rect">
+            <a:avLst/>
+          </a:prstGeom>
+          <a:noFill/>
+        </p:spPr>
+        <p:txBody>
+          <a:bodyPr wrap="square" rtlCol="0">
+            <a:spAutoFit/>
+          </a:bodyPr>
+          <a:lstStyle/>
+          <a:p>
+            <a:pPr algn="ctr"/>
+            <a:r>
+              <a:rPr lang="en-US" sz="3600" dirty="0" smtClean="0"/>
+              <a:t>Creating New Image from Scratch</a:t>
+            </a:r>
+            <a:endParaRPr lang="en-US" sz="3600" dirty="0"/>
+          </a:p>
+        </p:txBody>
+      </p:sp>
+      <p:grpSp>
+        <p:nvGrpSpPr>
+          <p:cNvPr id="16" name="Group 15"/>
+          <p:cNvGrpSpPr/>
+          <p:nvPr/>
+        </p:nvGrpSpPr>
+        <p:grpSpPr>
+          <a:xfrm>
+            <a:off x="830036" y="919035"/>
+            <a:ext cx="7467600" cy="2357565"/>
+            <a:chOff x="457200" y="1266903"/>
+            <a:chExt cx="8458200" cy="2357565"/>
+          </a:xfrm>
+        </p:grpSpPr>
+        <p:sp>
+          <p:nvSpPr>
+            <p:cNvPr id="5" name="Cube 4"/>
+            <p:cNvSpPr/>
+            <p:nvPr/>
+          </p:nvSpPr>
+          <p:spPr>
+            <a:xfrm>
+              <a:off x="3581400" y="1524000"/>
+              <a:ext cx="2286000" cy="1826935"/>
+            </a:xfrm>
+            <a:prstGeom prst="cube">
+              <a:avLst/>
+            </a:prstGeom>
+          </p:spPr>
+          <p:style>
+            <a:lnRef idx="2">
+              <a:schemeClr val="accent1">
+                <a:shade val="50000"/>
+              </a:schemeClr>
+            </a:lnRef>
+            <a:fillRef idx="1">
+              <a:schemeClr val="accent1"/>
+            </a:fillRef>
+            <a:effectRef idx="0">
+              <a:schemeClr val="accent1"/>
+            </a:effectRef>
+            <a:fontRef idx="minor">
+              <a:schemeClr val="lt1"/>
+            </a:fontRef>
+          </p:style>
+          <p:txBody>
+            <a:bodyPr rtlCol="0" anchor="ctr"/>
+            <a:lstStyle/>
+            <a:p>
+              <a:pPr algn="ctr"/>
+              <a:r>
+                <a:rPr lang="en-US" dirty="0" err="1" smtClean="0"/>
+                <a:t>Dcoker</a:t>
+              </a:r>
+              <a:r>
+                <a:rPr lang="en-US" dirty="0" smtClean="0"/>
+                <a:t> Image</a:t>
+              </a:r>
+              <a:endParaRPr lang="en-US" dirty="0"/>
+            </a:p>
+          </p:txBody>
+        </p:sp>
+        <p:sp>
+          <p:nvSpPr>
+            <p:cNvPr id="7" name="Bevel 6"/>
+            <p:cNvSpPr/>
+            <p:nvPr/>
+          </p:nvSpPr>
+          <p:spPr>
+            <a:xfrm>
+              <a:off x="6553200" y="2013106"/>
+              <a:ext cx="2362200" cy="914400"/>
+            </a:xfrm>
+            <a:prstGeom prst="bevel">
+              <a:avLst/>
+            </a:prstGeom>
+          </p:spPr>
+          <p:style>
+            <a:lnRef idx="2">
+              <a:schemeClr val="accent1">
+                <a:shade val="50000"/>
+              </a:schemeClr>
+            </a:lnRef>
+            <a:fillRef idx="1">
+              <a:schemeClr val="accent1"/>
+            </a:fillRef>
+            <a:effectRef idx="0">
+              <a:schemeClr val="accent1"/>
+            </a:effectRef>
+            <a:fontRef idx="minor">
+              <a:schemeClr val="lt1"/>
+            </a:fontRef>
+          </p:style>
+          <p:txBody>
+            <a:bodyPr rtlCol="0" anchor="ctr"/>
+            <a:lstStyle/>
+            <a:p>
+              <a:pPr algn="ctr"/>
+              <a:r>
+                <a:rPr lang="en-US" dirty="0" smtClean="0"/>
+                <a:t>Container</a:t>
+              </a:r>
+              <a:endParaRPr lang="en-US" dirty="0"/>
+            </a:p>
+          </p:txBody>
+        </p:sp>
+        <p:sp>
+          <p:nvSpPr>
+            <p:cNvPr id="12" name="Down Arrow 11"/>
+            <p:cNvSpPr/>
+            <p:nvPr/>
+          </p:nvSpPr>
+          <p:spPr>
+            <a:xfrm rot="16200000">
+              <a:off x="2903439" y="2190116"/>
+              <a:ext cx="347695" cy="820573"/>
+            </a:xfrm>
+            <a:prstGeom prst="downArrow">
+              <a:avLst/>
+            </a:prstGeom>
+          </p:spPr>
+          <p:style>
+            <a:lnRef idx="2">
+              <a:schemeClr val="accent1">
+                <a:shade val="50000"/>
+              </a:schemeClr>
+            </a:lnRef>
+            <a:fillRef idx="1">
+              <a:schemeClr val="accent1"/>
+            </a:fillRef>
+            <a:effectRef idx="0">
+              <a:schemeClr val="accent1"/>
+            </a:effectRef>
+            <a:fontRef idx="minor">
+              <a:schemeClr val="lt1"/>
+            </a:fontRef>
+          </p:style>
+          <p:txBody>
+            <a:bodyPr rtlCol="0" anchor="ctr"/>
+            <a:lstStyle/>
+            <a:p>
+              <a:pPr algn="ctr"/>
+              <a:endParaRPr lang="en-US"/>
+            </a:p>
+          </p:txBody>
+        </p:sp>
+        <p:grpSp>
+          <p:nvGrpSpPr>
+            <p:cNvPr id="14" name="Group 13"/>
+            <p:cNvGrpSpPr/>
+            <p:nvPr/>
+          </p:nvGrpSpPr>
+          <p:grpSpPr>
+            <a:xfrm>
+              <a:off x="457200" y="1266903"/>
+              <a:ext cx="2133600" cy="2357565"/>
+              <a:chOff x="656798" y="1397000"/>
+              <a:chExt cx="2133600" cy="2667000"/>
+            </a:xfrm>
+          </p:grpSpPr>
+          <p:sp>
+            <p:nvSpPr>
+              <p:cNvPr id="4" name="Rectangle 3"/>
+              <p:cNvSpPr/>
+              <p:nvPr/>
+            </p:nvSpPr>
+            <p:spPr>
+              <a:xfrm>
+                <a:off x="656798" y="1397000"/>
+                <a:ext cx="2133600" cy="2667000"/>
+              </a:xfrm>
+              <a:prstGeom prst="rect">
+                <a:avLst/>
+              </a:prstGeom>
+            </p:spPr>
+            <p:style>
+              <a:lnRef idx="2">
+                <a:schemeClr val="accent1">
+                  <a:shade val="50000"/>
+                </a:schemeClr>
+              </a:lnRef>
+              <a:fillRef idx="1">
+                <a:schemeClr val="accent1"/>
+              </a:fillRef>
+              <a:effectRef idx="0">
+                <a:schemeClr val="accent1"/>
+              </a:effectRef>
+              <a:fontRef idx="minor">
+                <a:schemeClr val="lt1"/>
+              </a:fontRef>
+            </p:style>
+            <p:txBody>
+              <a:bodyPr rtlCol="0" anchor="ctr"/>
+              <a:lstStyle/>
+              <a:p>
+                <a:pPr algn="ctr"/>
+                <a:endParaRPr lang="en-US" dirty="0"/>
+              </a:p>
+            </p:txBody>
+          </p:sp>
+          <p:sp>
+            <p:nvSpPr>
+              <p:cNvPr id="13" name="TextBox 12"/>
+              <p:cNvSpPr txBox="1"/>
+              <p:nvPr/>
+            </p:nvSpPr>
+            <p:spPr>
+              <a:xfrm>
+                <a:off x="838200" y="1446241"/>
+                <a:ext cx="1752600" cy="2308324"/>
+              </a:xfrm>
+              <a:prstGeom prst="rect">
+                <a:avLst/>
+              </a:prstGeom>
+              <a:noFill/>
+            </p:spPr>
+            <p:txBody>
+              <a:bodyPr wrap="square" rtlCol="0">
+                <a:spAutoFit/>
+              </a:bodyPr>
+              <a:lstStyle/>
+              <a:p>
+                <a:pPr algn="ctr"/>
+                <a:r>
+                  <a:rPr lang="en-US" dirty="0" smtClean="0"/>
+                  <a:t>Docker file</a:t>
+                </a:r>
+              </a:p>
+              <a:p>
+                <a:endParaRPr lang="en-US" dirty="0"/>
+              </a:p>
+              <a:p>
+                <a:pPr marL="285750" indent="-285750">
+                  <a:buFont typeface="Wingdings"/>
+                  <a:buChar char="Ø"/>
+                </a:pPr>
+                <a:r>
+                  <a:rPr lang="en-US" dirty="0" smtClean="0"/>
+                  <a:t>Nginx</a:t>
+                </a:r>
+              </a:p>
+              <a:p>
+                <a:pPr marL="285750" indent="-285750">
+                  <a:buFont typeface="Wingdings"/>
+                  <a:buChar char="Ø"/>
+                </a:pPr>
+                <a:r>
+                  <a:rPr lang="en-US" dirty="0" err="1" smtClean="0"/>
+                  <a:t>Php</a:t>
+                </a:r>
+                <a:endParaRPr lang="en-US" dirty="0" smtClean="0"/>
+              </a:p>
+              <a:p>
+                <a:pPr marL="285750" indent="-285750">
+                  <a:buFont typeface="Wingdings"/>
+                  <a:buChar char="Ø"/>
+                </a:pPr>
+                <a:r>
+                  <a:rPr lang="en-US" dirty="0" smtClean="0"/>
+                  <a:t>Java</a:t>
+                </a:r>
+              </a:p>
+              <a:p>
+                <a:pPr marL="285750" indent="-285750">
+                  <a:buFont typeface="Wingdings"/>
+                  <a:buChar char="Ø"/>
+                </a:pPr>
+                <a:r>
+                  <a:rPr lang="en-US" dirty="0" smtClean="0"/>
+                  <a:t>…</a:t>
+                </a:r>
+              </a:p>
+              <a:p>
+                <a:pPr marL="285750" indent="-285750">
+                  <a:buFont typeface="Wingdings"/>
+                  <a:buChar char="Ø"/>
+                </a:pPr>
+                <a:r>
+                  <a:rPr lang="en-US" dirty="0" smtClean="0"/>
+                  <a:t>…</a:t>
+                </a:r>
+              </a:p>
+              <a:p>
+                <a:pPr marL="285750" indent="-285750">
+                  <a:buFont typeface="Wingdings"/>
+                  <a:buChar char="Ø"/>
+                </a:pPr>
+                <a:endParaRPr lang="en-US" dirty="0"/>
+              </a:p>
+            </p:txBody>
+          </p:sp>
+        </p:grpSp>
+        <p:sp>
+          <p:nvSpPr>
+            <p:cNvPr id="15" name="Right Arrow 14"/>
+            <p:cNvSpPr/>
+            <p:nvPr/>
+          </p:nvSpPr>
+          <p:spPr>
+            <a:xfrm>
+              <a:off x="6019800" y="2426554"/>
+              <a:ext cx="419100" cy="347696"/>
+            </a:xfrm>
+            <a:prstGeom prst="rightArrow">
+              <a:avLst/>
+            </a:prstGeom>
+          </p:spPr>
+          <p:style>
+            <a:lnRef idx="2">
+              <a:schemeClr val="accent1">
+                <a:shade val="50000"/>
+              </a:schemeClr>
+            </a:lnRef>
+            <a:fillRef idx="1">
+              <a:schemeClr val="accent1"/>
+            </a:fillRef>
+            <a:effectRef idx="0">
+              <a:schemeClr val="accent1"/>
+            </a:effectRef>
+            <a:fontRef idx="minor">
+              <a:schemeClr val="lt1"/>
+            </a:fontRef>
+          </p:style>
+          <p:txBody>
+            <a:bodyPr rtlCol="0" anchor="ctr"/>
+            <a:lstStyle/>
+            <a:p>
+              <a:pPr algn="ctr"/>
+              <a:endParaRPr lang="en-US"/>
+            </a:p>
+          </p:txBody>
+        </p:sp>
+      </p:grpSp>
+      <p:sp>
+        <p:nvSpPr>
+          <p:cNvPr id="17" name="Rectangle 16"/>
+          <p:cNvSpPr/>
+          <p:nvPr/>
+        </p:nvSpPr>
+        <p:spPr>
+          <a:xfrm>
+            <a:off x="212272" y="3276600"/>
+            <a:ext cx="8703128" cy="923330"/>
+          </a:xfrm>
+          <a:prstGeom prst="rect">
+            <a:avLst/>
+          </a:prstGeom>
+        </p:spPr>
+        <p:txBody>
+          <a:bodyPr wrap="square">
+            <a:spAutoFit/>
+          </a:bodyPr>
+          <a:lstStyle/>
+          <a:p>
+            <a:r>
+              <a:rPr lang="en-US" dirty="0" smtClean="0"/>
+              <a:t>To create a Docker file follow the procedure below.</a:t>
+            </a:r>
+          </a:p>
+          <a:p>
+            <a:endParaRPr lang="en-US" dirty="0" smtClean="0"/>
+          </a:p>
+          <a:p>
+            <a:endParaRPr lang="en-US" dirty="0"/>
+          </a:p>
+        </p:txBody>
+      </p:sp>
+      <p:grpSp>
+        <p:nvGrpSpPr>
+          <p:cNvPr id="21" name="Group 20"/>
+          <p:cNvGrpSpPr/>
+          <p:nvPr/>
+        </p:nvGrpSpPr>
+        <p:grpSpPr>
+          <a:xfrm>
+            <a:off x="212272" y="3505200"/>
+            <a:ext cx="8703128" cy="2862322"/>
+            <a:chOff x="212272" y="3718679"/>
+            <a:chExt cx="8703128" cy="2862322"/>
+          </a:xfrm>
+        </p:grpSpPr>
+        <p:sp>
+          <p:nvSpPr>
+            <p:cNvPr id="19" name="Rectangle 18"/>
+            <p:cNvSpPr/>
+            <p:nvPr/>
+          </p:nvSpPr>
+          <p:spPr>
+            <a:xfrm>
+              <a:off x="212272" y="3718679"/>
+              <a:ext cx="8703128" cy="2862322"/>
+            </a:xfrm>
+            <a:prstGeom prst="rect">
+              <a:avLst/>
+            </a:prstGeom>
+          </p:spPr>
+          <p:txBody>
+            <a:bodyPr wrap="square">
+              <a:spAutoFit/>
+            </a:bodyPr>
+            <a:lstStyle/>
+            <a:p>
+              <a:r>
+                <a:rPr lang="en-US" b="1" dirty="0">
+                  <a:solidFill>
+                    <a:srgbClr val="C00000"/>
+                  </a:solidFill>
+                </a:rPr>
+                <a:t>Step 1</a:t>
+              </a:r>
+              <a:r>
+                <a:rPr lang="en-US" b="1" dirty="0" smtClean="0">
+                  <a:solidFill>
+                    <a:srgbClr val="C00000"/>
+                  </a:solidFill>
+                </a:rPr>
+                <a:t>: </a:t>
+              </a:r>
+              <a:r>
+                <a:rPr lang="en-US" dirty="0"/>
+                <a:t>Under the directory /home/USER/</a:t>
+              </a:r>
+              <a:r>
+                <a:rPr lang="en-US" dirty="0" err="1"/>
+                <a:t>DockerPrac</a:t>
+              </a:r>
+              <a:r>
+                <a:rPr lang="en-US" dirty="0"/>
+                <a:t> lets us create a small </a:t>
+              </a:r>
+              <a:r>
+                <a:rPr lang="en-US" dirty="0" err="1" smtClean="0"/>
+                <a:t>programme</a:t>
+              </a:r>
+              <a:r>
+                <a:rPr lang="en-US" dirty="0" smtClean="0"/>
+                <a:t> </a:t>
+              </a:r>
+              <a:r>
+                <a:rPr lang="en-US" dirty="0"/>
+                <a:t>called </a:t>
+              </a:r>
+              <a:r>
+                <a:rPr lang="en-US" dirty="0"/>
+                <a:t>ticker.sh</a:t>
+              </a:r>
+              <a:r>
+                <a:rPr lang="en-US" dirty="0"/>
+                <a:t> </a:t>
+              </a:r>
+            </a:p>
+            <a:p>
+              <a:endParaRPr lang="en-US" dirty="0"/>
+            </a:p>
+            <a:p>
+              <a:endParaRPr lang="en-US" dirty="0"/>
+            </a:p>
+            <a:p>
+              <a:endParaRPr lang="en-US" dirty="0"/>
+            </a:p>
+            <a:p>
+              <a:endParaRPr lang="en-US" dirty="0"/>
+            </a:p>
+            <a:p>
+              <a:endParaRPr lang="en-US" dirty="0"/>
+            </a:p>
+            <a:p>
+              <a:r>
+                <a:rPr lang="en-US" dirty="0"/>
+                <a:t>Which basically does the function of ticking from 1 – infinity.</a:t>
+              </a:r>
+            </a:p>
+            <a:p>
+              <a:endParaRPr lang="en-US" dirty="0"/>
+            </a:p>
+            <a:p>
+              <a:r>
+                <a:rPr lang="en-US" dirty="0"/>
+                <a:t>Now let us create a Docker Image which when run (Docker Container) displays ticker 1-…. </a:t>
+              </a:r>
+              <a:endParaRPr lang="en-US" dirty="0"/>
+            </a:p>
+          </p:txBody>
+        </p:sp>
+        <p:pic>
+          <p:nvPicPr>
+            <p:cNvPr id="20" name="Picture 19"/>
+            <p:cNvPicPr>
+              <a:picLocks noChangeAspect="1" noChangeArrowheads="1"/>
+            </p:cNvPicPr>
+            <p:nvPr/>
+          </p:nvPicPr>
+          <p:blipFill>
+            <a:blip r:embed="rId2">
+              <a:extLst>
+                <a:ext uri="{28A0092B-C50C-407E-A947-70E740481C1C}">
+                  <a14:useLocalDpi xmlns:a14="http://schemas.microsoft.com/office/drawing/2010/main" val="0"/>
+                </a:ext>
+              </a:extLst>
+            </a:blip>
+            <a:srcRect/>
+            <a:stretch>
+              <a:fillRect/>
+            </a:stretch>
+          </p:blipFill>
+          <p:spPr bwMode="auto">
+            <a:xfrm>
+              <a:off x="1905000" y="4114800"/>
+              <a:ext cx="1905000" cy="1375383"/>
+            </a:xfrm>
+            <a:prstGeom prst="rect">
+              <a:avLst/>
+            </a:prstGeom>
+            <a:noFill/>
+            <a:ln>
+              <a:noFill/>
+            </a:ln>
+            <a:extLst>
+              <a:ext uri="{909E8E84-426E-40DD-AFC4-6F175D3DCCD1}">
+                <a14:hiddenFill xmlns:a14="http://schemas.microsoft.com/office/drawing/2010/main">
+                  <a:solidFill>
+                    <a:schemeClr val="accent1"/>
+                  </a:solidFill>
+                </a14:hiddenFill>
+              </a:ext>
+              <a:ext uri="{91240B29-F687-4F45-9708-019B960494DF}">
+                <a14:hiddenLine xmlns:a14="http://schemas.microsoft.com/office/drawing/2010/main" w="9525">
+                  <a:solidFill>
+                    <a:schemeClr val="tx1"/>
+                  </a:solidFill>
+                  <a:miter lim="800000"/>
+                  <a:headEnd/>
+                  <a:tailEnd/>
+                </a14:hiddenLine>
+              </a:ext>
+            </a:extLst>
+          </p:spPr>
+        </p:pic>
+      </p:grpSp>
+    </p:spTree>
+    <p:extLst>
+      <p:ext uri="{BB962C8B-B14F-4D97-AF65-F5344CB8AC3E}">
+        <p14:creationId xmlns:p14="http://schemas.microsoft.com/office/powerpoint/2010/main" val="3849654387"/>
+      </p:ext>
+    </p:extLst>
+  </p:cSld>
+  <p:clrMapOvr>
+    <a:masterClrMapping/>
+  </p:clrMapOvr>
+</p:sld>
+</file>
+
+<file path=ppt/slides/slide15.xml><?xml version="1.0" encoding="utf-8"?>
+<p:sld xmlns:a="http://schemas.openxmlformats.org/drawingml/2006/main" xmlns:r="http://schemas.openxmlformats.org/officeDocument/2006/relationships" xmlns:p="http://schemas.openxmlformats.org/presentationml/2006/main">
+  <p:cSld>
+    <p:spTree>
+      <p:nvGrpSpPr>
+        <p:cNvPr id="1" name=""/>
+        <p:cNvGrpSpPr/>
+        <p:nvPr/>
+      </p:nvGrpSpPr>
+      <p:grpSpPr>
+        <a:xfrm>
+          <a:off x="0" y="0"/>
+          <a:ext cx="0" cy="0"/>
+          <a:chOff x="0" y="0"/>
+          <a:chExt cx="0" cy="0"/>
+        </a:xfrm>
+      </p:grpSpPr>
+      <p:sp>
+        <p:nvSpPr>
+          <p:cNvPr id="11" name="Curved Up Arrow 10"/>
+          <p:cNvSpPr/>
+          <p:nvPr/>
+        </p:nvSpPr>
+        <p:spPr>
+          <a:xfrm rot="20998053">
+            <a:off x="1767268" y="4607923"/>
+            <a:ext cx="2222831" cy="692263"/>
+          </a:xfrm>
+          <a:prstGeom prst="curvedUpArrow">
+            <a:avLst/>
+          </a:prstGeom>
+        </p:spPr>
+        <p:style>
+          <a:lnRef idx="2">
+            <a:schemeClr val="accent1">
+              <a:shade val="50000"/>
+            </a:schemeClr>
+          </a:lnRef>
+          <a:fillRef idx="1">
+            <a:schemeClr val="accent1"/>
+          </a:fillRef>
+          <a:effectRef idx="0">
+            <a:schemeClr val="accent1"/>
+          </a:effectRef>
+          <a:fontRef idx="minor">
+            <a:schemeClr val="lt1"/>
+          </a:fontRef>
+        </p:style>
+        <p:txBody>
+          <a:bodyPr rtlCol="0" anchor="ctr"/>
+          <a:lstStyle/>
+          <a:p>
+            <a:pPr algn="ctr"/>
+            <a:endParaRPr lang="en-US">
+              <a:solidFill>
+                <a:schemeClr val="tx1"/>
+              </a:solidFill>
+            </a:endParaRPr>
+          </a:p>
+        </p:txBody>
+      </p:sp>
+      <p:sp>
+        <p:nvSpPr>
+          <p:cNvPr id="5" name="Rectangle 4"/>
+          <p:cNvSpPr/>
+          <p:nvPr/>
+        </p:nvSpPr>
+        <p:spPr>
+          <a:xfrm>
+            <a:off x="175986" y="833803"/>
+            <a:ext cx="8703128" cy="6586418"/>
+          </a:xfrm>
+          <a:prstGeom prst="rect">
+            <a:avLst/>
+          </a:prstGeom>
+        </p:spPr>
+        <p:txBody>
+          <a:bodyPr wrap="square">
+            <a:spAutoFit/>
+          </a:bodyPr>
+          <a:lstStyle/>
+          <a:p>
+            <a:r>
+              <a:rPr lang="en-US" b="1" dirty="0" smtClean="0">
+                <a:solidFill>
+                  <a:srgbClr val="C00000"/>
+                </a:solidFill>
+              </a:rPr>
+              <a:t>Step 2: </a:t>
+            </a:r>
+            <a:r>
+              <a:rPr lang="en-US" dirty="0"/>
+              <a:t>Now create </a:t>
+            </a:r>
+            <a:r>
+              <a:rPr lang="en-US" dirty="0" smtClean="0"/>
+              <a:t>a file name </a:t>
+            </a:r>
+            <a:r>
+              <a:rPr lang="en-US" dirty="0" err="1" smtClean="0"/>
+              <a:t>Dockerfile</a:t>
+            </a:r>
+            <a:r>
+              <a:rPr lang="en-US" dirty="0" smtClean="0"/>
+              <a:t> (by convention this is the method D capital). Under the same location /home/USER/</a:t>
+            </a:r>
+            <a:r>
+              <a:rPr lang="en-US" dirty="0" err="1" smtClean="0"/>
+              <a:t>DockerPrac</a:t>
+            </a:r>
+            <a:r>
+              <a:rPr lang="en-US" dirty="0" smtClean="0"/>
+              <a:t> as below.</a:t>
+            </a:r>
+          </a:p>
+          <a:p>
+            <a:endParaRPr lang="en-US" dirty="0"/>
+          </a:p>
+          <a:p>
+            <a:endParaRPr lang="en-US" dirty="0" smtClean="0"/>
+          </a:p>
+          <a:p>
+            <a:endParaRPr lang="en-US" dirty="0"/>
+          </a:p>
+          <a:p>
+            <a:endParaRPr lang="en-US" dirty="0" smtClean="0"/>
+          </a:p>
+          <a:p>
+            <a:endParaRPr lang="en-US" dirty="0"/>
+          </a:p>
+          <a:p>
+            <a:endParaRPr lang="en-US" dirty="0" smtClean="0"/>
+          </a:p>
+          <a:p>
+            <a:endParaRPr lang="en-US" dirty="0"/>
+          </a:p>
+          <a:p>
+            <a:endParaRPr lang="en-US" dirty="0" smtClean="0"/>
+          </a:p>
+          <a:p>
+            <a:endParaRPr lang="en-US" dirty="0"/>
+          </a:p>
+          <a:p>
+            <a:r>
+              <a:rPr lang="en-US" b="1" dirty="0">
+                <a:solidFill>
+                  <a:srgbClr val="C00000"/>
+                </a:solidFill>
+              </a:rPr>
+              <a:t>Step 2: </a:t>
+            </a:r>
+            <a:r>
+              <a:rPr lang="en-US" dirty="0"/>
+              <a:t>Now create a </a:t>
+            </a:r>
+            <a:r>
+              <a:rPr lang="en-US" dirty="0" smtClean="0"/>
+              <a:t>Docker image from this as follows.</a:t>
+            </a:r>
+          </a:p>
+          <a:p>
+            <a:r>
+              <a:rPr lang="en-US" b="1" i="1" dirty="0"/>
+              <a:t>$ </a:t>
+            </a:r>
+            <a:r>
+              <a:rPr lang="en-US" b="1" i="1" dirty="0" err="1"/>
+              <a:t>sudo</a:t>
+            </a:r>
+            <a:r>
+              <a:rPr lang="en-US" b="1" i="1" dirty="0"/>
+              <a:t> </a:t>
+            </a:r>
+            <a:r>
+              <a:rPr lang="en-US" b="1" i="1" dirty="0" err="1"/>
+              <a:t>docker</a:t>
+            </a:r>
+            <a:r>
+              <a:rPr lang="en-US" b="1" i="1" dirty="0"/>
+              <a:t> </a:t>
+            </a:r>
+            <a:r>
+              <a:rPr lang="en-US" b="1" i="1" dirty="0" smtClean="0"/>
+              <a:t>build –t </a:t>
+            </a:r>
+            <a:r>
+              <a:rPr lang="en-US" b="1" i="1" dirty="0" err="1" smtClean="0"/>
+              <a:t>ticker_ubuntu</a:t>
+            </a:r>
+            <a:r>
+              <a:rPr lang="en-US" b="1" i="1" dirty="0" smtClean="0"/>
+              <a:t> . (Note: -t refers to tag a name to new IMAGE and mind the </a:t>
+            </a:r>
+            <a:r>
+              <a:rPr lang="en-US" sz="2000" b="1" i="1" dirty="0" smtClean="0"/>
+              <a:t>. DOT it sates from the current directory</a:t>
+            </a:r>
+            <a:r>
+              <a:rPr lang="en-US" b="1" i="1" dirty="0" smtClean="0"/>
+              <a:t>. Very Necessary make sure the ticker.sh file is present in the same directory as the </a:t>
+            </a:r>
+            <a:r>
+              <a:rPr lang="en-US" b="1" i="1" dirty="0" err="1" smtClean="0"/>
+              <a:t>Dcokerfile</a:t>
+            </a:r>
+            <a:r>
+              <a:rPr lang="en-US" b="1" i="1" dirty="0" smtClean="0"/>
+              <a:t> is present for the example above.</a:t>
+            </a:r>
+            <a:endParaRPr lang="en-US" dirty="0"/>
+          </a:p>
+          <a:p>
+            <a:r>
+              <a:rPr lang="en-US" b="1" dirty="0">
+                <a:solidFill>
+                  <a:srgbClr val="C00000"/>
+                </a:solidFill>
+              </a:rPr>
+              <a:t>Step </a:t>
+            </a:r>
+            <a:r>
+              <a:rPr lang="en-US" b="1" dirty="0" smtClean="0">
+                <a:solidFill>
+                  <a:srgbClr val="C00000"/>
+                </a:solidFill>
+              </a:rPr>
+              <a:t>3: </a:t>
+            </a:r>
+            <a:r>
+              <a:rPr lang="en-US" dirty="0" smtClean="0"/>
+              <a:t>The IMAGE is created with the name </a:t>
+            </a:r>
+            <a:r>
+              <a:rPr lang="en-US" dirty="0" err="1" smtClean="0"/>
+              <a:t>ticker_ubuntu</a:t>
+            </a:r>
+            <a:r>
+              <a:rPr lang="en-US" dirty="0" smtClean="0"/>
+              <a:t> </a:t>
+            </a:r>
+          </a:p>
+          <a:p>
+            <a:r>
+              <a:rPr lang="en-US" b="1" i="1" dirty="0"/>
+              <a:t>$ </a:t>
+            </a:r>
+            <a:r>
+              <a:rPr lang="en-US" b="1" i="1" dirty="0" err="1"/>
+              <a:t>sudo</a:t>
+            </a:r>
+            <a:r>
+              <a:rPr lang="en-US" b="1" i="1" dirty="0"/>
+              <a:t> </a:t>
+            </a:r>
+            <a:r>
+              <a:rPr lang="en-US" b="1" i="1" dirty="0" err="1"/>
+              <a:t>docker</a:t>
+            </a:r>
+            <a:r>
+              <a:rPr lang="en-US" b="1" i="1" dirty="0"/>
+              <a:t> </a:t>
+            </a:r>
+            <a:r>
+              <a:rPr lang="en-US" b="1" i="1" dirty="0" smtClean="0"/>
+              <a:t>images</a:t>
+            </a:r>
+          </a:p>
+          <a:p>
+            <a:r>
+              <a:rPr lang="en-US" b="1" i="1" dirty="0"/>
+              <a:t>$ </a:t>
+            </a:r>
+            <a:r>
+              <a:rPr lang="en-US" b="1" i="1" dirty="0" err="1"/>
+              <a:t>sudo</a:t>
+            </a:r>
+            <a:r>
+              <a:rPr lang="en-US" b="1" i="1" dirty="0"/>
+              <a:t> </a:t>
+            </a:r>
+            <a:r>
+              <a:rPr lang="en-US" b="1" i="1" dirty="0" err="1"/>
+              <a:t>docker</a:t>
+            </a:r>
+            <a:r>
+              <a:rPr lang="en-US" b="1" i="1" dirty="0"/>
+              <a:t> </a:t>
+            </a:r>
+            <a:r>
+              <a:rPr lang="en-US" b="1" i="1" dirty="0" smtClean="0"/>
+              <a:t>run –d –name </a:t>
+            </a:r>
+            <a:r>
+              <a:rPr lang="en-US" b="1" i="1" dirty="0" err="1" smtClean="0"/>
+              <a:t>check_ticker</a:t>
+            </a:r>
+            <a:r>
+              <a:rPr lang="en-US" b="1" i="1" dirty="0" smtClean="0"/>
+              <a:t> </a:t>
+            </a:r>
+            <a:r>
+              <a:rPr lang="en-US" b="1" i="1" dirty="0" err="1" smtClean="0"/>
+              <a:t>ticker_ubuntu</a:t>
+            </a:r>
+            <a:r>
+              <a:rPr lang="en-US" b="1" i="1" dirty="0" smtClean="0"/>
+              <a:t> </a:t>
+            </a:r>
+          </a:p>
+          <a:p>
+            <a:r>
+              <a:rPr lang="en-US" b="1" i="1" dirty="0"/>
+              <a:t>$ </a:t>
+            </a:r>
+            <a:r>
+              <a:rPr lang="en-US" b="1" i="1" dirty="0" err="1"/>
+              <a:t>sudo</a:t>
+            </a:r>
+            <a:r>
+              <a:rPr lang="en-US" b="1" i="1" dirty="0"/>
+              <a:t> </a:t>
+            </a:r>
+            <a:r>
+              <a:rPr lang="en-US" b="1" i="1" dirty="0" err="1"/>
+              <a:t>docker</a:t>
+            </a:r>
+            <a:r>
+              <a:rPr lang="en-US" b="1" i="1" dirty="0"/>
+              <a:t> </a:t>
+            </a:r>
+            <a:r>
+              <a:rPr lang="en-US" b="1" i="1" dirty="0" smtClean="0"/>
+              <a:t>logs </a:t>
+            </a:r>
+            <a:r>
+              <a:rPr lang="en-US" b="1" i="1" dirty="0" err="1" smtClean="0"/>
+              <a:t>check_ticker</a:t>
+            </a:r>
+            <a:endParaRPr lang="en-US" b="1" i="1" dirty="0" smtClean="0"/>
+          </a:p>
+          <a:p>
+            <a:pPr algn="ctr"/>
+            <a:r>
+              <a:rPr lang="en-US" sz="2400" b="1" i="1" dirty="0" smtClean="0"/>
+              <a:t>MUST GET COUNT GOING EVERY SECOND……</a:t>
+            </a:r>
+            <a:endParaRPr lang="en-US" sz="2400" dirty="0"/>
+          </a:p>
+          <a:p>
+            <a:endParaRPr lang="en-US" dirty="0" smtClean="0"/>
+          </a:p>
+          <a:p>
+            <a:endParaRPr lang="en-US" dirty="0"/>
+          </a:p>
+        </p:txBody>
+      </p:sp>
+      <p:sp>
+        <p:nvSpPr>
+          <p:cNvPr id="2" name="TextBox 1"/>
+          <p:cNvSpPr txBox="1"/>
+          <p:nvPr/>
+        </p:nvSpPr>
+        <p:spPr>
+          <a:xfrm>
+            <a:off x="212272" y="152400"/>
+            <a:ext cx="8703128" cy="646331"/>
+          </a:xfrm>
+          <a:prstGeom prst="rect">
+            <a:avLst/>
+          </a:prstGeom>
+          <a:noFill/>
+        </p:spPr>
+        <p:txBody>
+          <a:bodyPr wrap="square" rtlCol="0">
+            <a:spAutoFit/>
+          </a:bodyPr>
+          <a:lstStyle/>
+          <a:p>
+            <a:pPr algn="ctr"/>
+            <a:r>
+              <a:rPr lang="en-US" sz="3600" dirty="0" smtClean="0"/>
+              <a:t>Creating New Image from Scratch </a:t>
+            </a:r>
+            <a:r>
+              <a:rPr lang="en-US" sz="3600" dirty="0" err="1" smtClean="0"/>
+              <a:t>cont</a:t>
+            </a:r>
+            <a:r>
+              <a:rPr lang="en-US" sz="3600" dirty="0" smtClean="0"/>
+              <a:t>…</a:t>
+            </a:r>
+            <a:endParaRPr lang="en-US" sz="3600" dirty="0"/>
+          </a:p>
+        </p:txBody>
+      </p:sp>
       <p:pic>
         <p:nvPicPr>
-          <p:cNvPr id="1026" name="Picture 2"/>
+          <p:cNvPr id="6" name="Picture 2"/>
           <p:cNvPicPr>
             <a:picLocks noChangeAspect="1" noChangeArrowheads="1"/>
           </p:cNvPicPr>
           <p:nvPr/>
         </p:nvPicPr>
-        <p:blipFill rotWithShape="1">
-          <a:blip r:embed="rId2">
+        <p:blipFill>
+          <a:blip r:embed="rId3">
             <a:extLst>
               <a:ext uri="{28A0092B-C50C-407E-A947-70E740481C1C}">
                 <a14:useLocalDpi xmlns:a14="http://schemas.microsoft.com/office/drawing/2010/main" val="0"/>
               </a:ext>
             </a:extLst>
           </a:blip>
-          <a:srcRect l="4166" t="5599" r="4667" b="16029"/>
-          <a:stretch/>
+          <a:srcRect/>
+          <a:stretch>
+            <a:fillRect/>
+          </a:stretch>
         </p:blipFill>
         <p:spPr bwMode="auto">
           <a:xfrm>
-            <a:off x="311422" y="685800"/>
-            <a:ext cx="8481144" cy="4556760"/>
+            <a:off x="212272" y="1524000"/>
+            <a:ext cx="5695950" cy="2171700"/>
           </a:xfrm>
           <a:prstGeom prst="rect">
             <a:avLst/>
@@ -4968,20 +7399,148 @@
     </p:spTree>
     <p:extLst>
       <p:ext uri="{BB962C8B-B14F-4D97-AF65-F5344CB8AC3E}">
-        <p14:creationId xmlns:p14="http://schemas.microsoft.com/office/powerpoint/2010/main" val="3508267598"/>
+        <p14:creationId xmlns:p14="http://schemas.microsoft.com/office/powerpoint/2010/main" val="3636262998"/>
       </p:ext>
     </p:extLst>
   </p:cSld>
   <p:clrMapOvr>
     <a:masterClrMapping/>
   </p:clrMapOvr>
-  <p:timing>
-    <p:tnLst>
-      <p:par>
-        <p:cTn id="1" dur="indefinite" restart="never" nodeType="tmRoot"/>
-      </p:par>
-    </p:tnLst>
-  </p:timing>
+</p:sld>
+</file>
+
+<file path=ppt/slides/slide16.xml><?xml version="1.0" encoding="utf-8"?>
+<p:sld xmlns:a="http://schemas.openxmlformats.org/drawingml/2006/main" xmlns:r="http://schemas.openxmlformats.org/officeDocument/2006/relationships" xmlns:p="http://schemas.openxmlformats.org/presentationml/2006/main">
+  <p:cSld>
+    <p:spTree>
+      <p:nvGrpSpPr>
+        <p:cNvPr id="1" name=""/>
+        <p:cNvGrpSpPr/>
+        <p:nvPr/>
+      </p:nvGrpSpPr>
+      <p:grpSpPr>
+        <a:xfrm>
+          <a:off x="0" y="0"/>
+          <a:ext cx="0" cy="0"/>
+          <a:chOff x="0" y="0"/>
+          <a:chExt cx="0" cy="0"/>
+        </a:xfrm>
+      </p:grpSpPr>
+      <p:sp>
+        <p:nvSpPr>
+          <p:cNvPr id="2" name="TextBox 1"/>
+          <p:cNvSpPr txBox="1"/>
+          <p:nvPr/>
+        </p:nvSpPr>
+        <p:spPr>
+          <a:xfrm>
+            <a:off x="609600" y="1752600"/>
+            <a:ext cx="8305800" cy="2394284"/>
+          </a:xfrm>
+          <a:prstGeom prst="rect">
+            <a:avLst/>
+          </a:prstGeom>
+          <a:noFill/>
+        </p:spPr>
+        <p:txBody>
+          <a:bodyPr wrap="none" rtlCol="0">
+            <a:prstTxWarp prst="textPlain">
+              <a:avLst/>
+            </a:prstTxWarp>
+            <a:spAutoFit/>
+          </a:bodyPr>
+          <a:lstStyle/>
+          <a:p>
+            <a:pPr algn="ctr"/>
+            <a:r>
+              <a:rPr lang="en-US" sz="3200" b="1" dirty="0" smtClean="0">
+                <a:solidFill>
+                  <a:schemeClr val="tx2">
+                    <a:lumMod val="75000"/>
+                  </a:schemeClr>
+                </a:solidFill>
+                <a:effectLst>
+                  <a:innerShdw blurRad="63500" dist="50800" dir="8100000">
+                    <a:prstClr val="black">
+                      <a:alpha val="50000"/>
+                    </a:prstClr>
+                  </a:innerShdw>
+                  <a:reflection blurRad="6350" stA="55000" endA="300" endPos="45500" dir="5400000" sy="-100000" algn="bl" rotWithShape="0"/>
+                </a:effectLst>
+                <a:latin typeface="Chiller" panose="04020404031007020602" pitchFamily="82" charset="0"/>
+              </a:rPr>
+              <a:t>THANK YOU FOR LEARNING</a:t>
+            </a:r>
+            <a:endParaRPr lang="en-US" sz="3200" b="1" dirty="0">
+              <a:solidFill>
+                <a:schemeClr val="tx2">
+                  <a:lumMod val="75000"/>
+                </a:schemeClr>
+              </a:solidFill>
+              <a:effectLst>
+                <a:innerShdw blurRad="63500" dist="50800" dir="8100000">
+                  <a:prstClr val="black">
+                    <a:alpha val="50000"/>
+                  </a:prstClr>
+                </a:innerShdw>
+                <a:reflection blurRad="6350" stA="55000" endA="300" endPos="45500" dir="5400000" sy="-100000" algn="bl" rotWithShape="0"/>
+              </a:effectLst>
+              <a:latin typeface="Chiller" panose="04020404031007020602" pitchFamily="82" charset="0"/>
+            </a:endParaRPr>
+          </a:p>
+        </p:txBody>
+      </p:sp>
+      <p:pic>
+        <p:nvPicPr>
+          <p:cNvPr id="3" name="Picture 2" descr="https://d3nmt5vlzunoa1.cloudfront.net/phpstorm/files/2015/10/large_v-trans.png"/>
+          <p:cNvPicPr>
+            <a:picLocks noChangeAspect="1" noChangeArrowheads="1"/>
+          </p:cNvPicPr>
+          <p:nvPr/>
+        </p:nvPicPr>
+        <p:blipFill>
+          <a:blip r:embed="rId2" cstate="print">
+            <a:extLst>
+              <a:ext uri="{28A0092B-C50C-407E-A947-70E740481C1C}">
+                <a14:useLocalDpi xmlns:a14="http://schemas.microsoft.com/office/drawing/2010/main" val="0"/>
+              </a:ext>
+            </a:extLst>
+          </a:blip>
+          <a:srcRect/>
+          <a:stretch>
+            <a:fillRect/>
+          </a:stretch>
+        </p:blipFill>
+        <p:spPr bwMode="auto">
+          <a:xfrm>
+            <a:off x="3124200" y="4343400"/>
+            <a:ext cx="2562287" cy="2286000"/>
+          </a:xfrm>
+          <a:prstGeom prst="rect">
+            <a:avLst/>
+          </a:prstGeom>
+          <a:noFill/>
+          <a:extLst>
+            <a:ext uri="{909E8E84-426E-40DD-AFC4-6F175D3DCCD1}">
+              <a14:hiddenFill xmlns:a14="http://schemas.microsoft.com/office/drawing/2010/main">
+                <a:solidFill>
+                  <a:srgbClr val="FFFFFF"/>
+                </a:solidFill>
+              </a14:hiddenFill>
+            </a:ext>
+          </a:extLst>
+        </p:spPr>
+      </p:pic>
+    </p:spTree>
+    <p:extLst>
+      <p:ext uri="{BB962C8B-B14F-4D97-AF65-F5344CB8AC3E}">
+        <p14:creationId xmlns:p14="http://schemas.microsoft.com/office/powerpoint/2010/main" val="2412973351"/>
+      </p:ext>
+    </p:extLst>
+  </p:cSld>
+  <p:clrMapOvr>
+    <a:masterClrMapping/>
+  </p:clrMapOvr>
 </p:sld>
 </file>
 
@@ -5343,477 +7902,492 @@
           </a:p>
         </p:txBody>
       </p:sp>
-      <p:sp>
-        <p:nvSpPr>
-          <p:cNvPr id="16" name="Rectangle 15"/>
-          <p:cNvSpPr/>
+      <p:grpSp>
+        <p:nvGrpSpPr>
+          <p:cNvPr id="5" name="Group 4"/>
+          <p:cNvGrpSpPr/>
           <p:nvPr/>
-        </p:nvSpPr>
-        <p:spPr>
+        </p:nvGrpSpPr>
+        <p:grpSpPr>
           <a:xfrm>
-            <a:off x="656798" y="1397000"/>
-            <a:ext cx="2133600" cy="2667000"/>
+            <a:off x="627228" y="1397000"/>
+            <a:ext cx="8173872" cy="4521200"/>
+            <a:chOff x="627228" y="1397000"/>
+            <a:chExt cx="8173872" cy="4521200"/>
           </a:xfrm>
-          <a:prstGeom prst="rect">
-            <a:avLst/>
-          </a:prstGeom>
-        </p:spPr>
-        <p:style>
-          <a:lnRef idx="2">
-            <a:schemeClr val="accent1">
-              <a:shade val="50000"/>
-            </a:schemeClr>
-          </a:lnRef>
-          <a:fillRef idx="1">
-            <a:schemeClr val="accent1"/>
-          </a:fillRef>
-          <a:effectRef idx="0">
-            <a:schemeClr val="accent1"/>
-          </a:effectRef>
-          <a:fontRef idx="minor">
-            <a:schemeClr val="lt1"/>
-          </a:fontRef>
-        </p:style>
-        <p:txBody>
-          <a:bodyPr rtlCol="0" anchor="ctr"/>
-          <a:lstStyle/>
-          <a:p>
-            <a:pPr algn="ctr"/>
-            <a:endParaRPr lang="en-US" dirty="0"/>
-          </a:p>
-        </p:txBody>
-      </p:sp>
-      <p:sp>
-        <p:nvSpPr>
-          <p:cNvPr id="18" name="Cube 17"/>
-          <p:cNvSpPr/>
-          <p:nvPr/>
-        </p:nvSpPr>
-        <p:spPr>
-          <a:xfrm>
-            <a:off x="3962400" y="1397000"/>
-            <a:ext cx="2286000" cy="2667000"/>
-          </a:xfrm>
-          <a:prstGeom prst="cube">
-            <a:avLst/>
-          </a:prstGeom>
-        </p:spPr>
-        <p:style>
-          <a:lnRef idx="2">
-            <a:schemeClr val="accent1">
-              <a:shade val="50000"/>
-            </a:schemeClr>
-          </a:lnRef>
-          <a:fillRef idx="1">
-            <a:schemeClr val="accent1"/>
-          </a:fillRef>
-          <a:effectRef idx="0">
-            <a:schemeClr val="accent1"/>
-          </a:effectRef>
-          <a:fontRef idx="minor">
-            <a:schemeClr val="lt1"/>
-          </a:fontRef>
-        </p:style>
-        <p:txBody>
-          <a:bodyPr rtlCol="0" anchor="ctr"/>
-          <a:lstStyle/>
-          <a:p>
-            <a:pPr algn="ctr"/>
-            <a:r>
-              <a:rPr lang="en-US" dirty="0" err="1" smtClean="0"/>
-              <a:t>Dcoker</a:t>
-            </a:r>
-            <a:r>
-              <a:rPr lang="en-US" dirty="0" smtClean="0"/>
-              <a:t> Image</a:t>
-            </a:r>
-            <a:endParaRPr lang="en-US" dirty="0"/>
-          </a:p>
-        </p:txBody>
-      </p:sp>
-      <p:sp>
-        <p:nvSpPr>
-          <p:cNvPr id="19" name="Bevel 18"/>
-          <p:cNvSpPr/>
-          <p:nvPr/>
-        </p:nvSpPr>
-        <p:spPr>
-          <a:xfrm>
-            <a:off x="627228" y="4968209"/>
-            <a:ext cx="2362200" cy="914400"/>
-          </a:xfrm>
-          <a:prstGeom prst="bevel">
-            <a:avLst/>
-          </a:prstGeom>
-        </p:spPr>
-        <p:style>
-          <a:lnRef idx="2">
-            <a:schemeClr val="accent1">
-              <a:shade val="50000"/>
-            </a:schemeClr>
-          </a:lnRef>
-          <a:fillRef idx="1">
-            <a:schemeClr val="accent1"/>
-          </a:fillRef>
-          <a:effectRef idx="0">
-            <a:schemeClr val="accent1"/>
-          </a:effectRef>
-          <a:fontRef idx="minor">
-            <a:schemeClr val="lt1"/>
-          </a:fontRef>
-        </p:style>
-        <p:txBody>
-          <a:bodyPr rtlCol="0" anchor="ctr"/>
-          <a:lstStyle/>
-          <a:p>
-            <a:pPr algn="ctr"/>
-            <a:r>
-              <a:rPr lang="en-US" dirty="0" smtClean="0"/>
-              <a:t>Container</a:t>
-            </a:r>
-            <a:endParaRPr lang="en-US" dirty="0"/>
-          </a:p>
-        </p:txBody>
-      </p:sp>
-      <p:sp>
-        <p:nvSpPr>
-          <p:cNvPr id="20" name="Bevel 19"/>
-          <p:cNvSpPr/>
-          <p:nvPr/>
-        </p:nvSpPr>
-        <p:spPr>
-          <a:xfrm>
-            <a:off x="3657600" y="5003800"/>
-            <a:ext cx="2362200" cy="914400"/>
-          </a:xfrm>
-          <a:prstGeom prst="bevel">
-            <a:avLst/>
-          </a:prstGeom>
-        </p:spPr>
-        <p:style>
-          <a:lnRef idx="2">
-            <a:schemeClr val="accent1">
-              <a:shade val="50000"/>
-            </a:schemeClr>
-          </a:lnRef>
-          <a:fillRef idx="1">
-            <a:schemeClr val="accent1"/>
-          </a:fillRef>
-          <a:effectRef idx="0">
-            <a:schemeClr val="accent1"/>
-          </a:effectRef>
-          <a:fontRef idx="minor">
-            <a:schemeClr val="lt1"/>
-          </a:fontRef>
-        </p:style>
-        <p:txBody>
-          <a:bodyPr rtlCol="0" anchor="ctr"/>
-          <a:lstStyle/>
-          <a:p>
-            <a:pPr algn="ctr"/>
-            <a:r>
-              <a:rPr lang="en-US" dirty="0" smtClean="0"/>
-              <a:t>Container</a:t>
-            </a:r>
-            <a:endParaRPr lang="en-US" dirty="0"/>
-          </a:p>
-        </p:txBody>
-      </p:sp>
-      <p:sp>
-        <p:nvSpPr>
-          <p:cNvPr id="21" name="Bevel 20"/>
-          <p:cNvSpPr/>
-          <p:nvPr/>
-        </p:nvSpPr>
-        <p:spPr>
-          <a:xfrm>
-            <a:off x="6438900" y="5003800"/>
-            <a:ext cx="2362200" cy="914400"/>
-          </a:xfrm>
-          <a:prstGeom prst="bevel">
-            <a:avLst/>
-          </a:prstGeom>
-        </p:spPr>
-        <p:style>
-          <a:lnRef idx="2">
-            <a:schemeClr val="accent1">
-              <a:shade val="50000"/>
-            </a:schemeClr>
-          </a:lnRef>
-          <a:fillRef idx="1">
-            <a:schemeClr val="accent1"/>
-          </a:fillRef>
-          <a:effectRef idx="0">
-            <a:schemeClr val="accent1"/>
-          </a:effectRef>
-          <a:fontRef idx="minor">
-            <a:schemeClr val="lt1"/>
-          </a:fontRef>
-        </p:style>
-        <p:txBody>
-          <a:bodyPr rtlCol="0" anchor="ctr"/>
-          <a:lstStyle/>
-          <a:p>
-            <a:pPr algn="ctr"/>
-            <a:r>
-              <a:rPr lang="en-US" dirty="0" smtClean="0"/>
-              <a:t>Container</a:t>
-            </a:r>
-            <a:endParaRPr lang="en-US" dirty="0"/>
-          </a:p>
-        </p:txBody>
-      </p:sp>
-      <p:sp>
-        <p:nvSpPr>
-          <p:cNvPr id="22" name="Down Arrow 21"/>
-          <p:cNvSpPr/>
-          <p:nvPr/>
-        </p:nvSpPr>
-        <p:spPr>
-          <a:xfrm rot="3859780">
-            <a:off x="2631819" y="3790391"/>
-            <a:ext cx="347695" cy="1321811"/>
-          </a:xfrm>
-          <a:prstGeom prst="downArrow">
-            <a:avLst/>
-          </a:prstGeom>
-        </p:spPr>
-        <p:style>
-          <a:lnRef idx="2">
-            <a:schemeClr val="accent1">
-              <a:shade val="50000"/>
-            </a:schemeClr>
-          </a:lnRef>
-          <a:fillRef idx="1">
-            <a:schemeClr val="accent1"/>
-          </a:fillRef>
-          <a:effectRef idx="0">
-            <a:schemeClr val="accent1"/>
-          </a:effectRef>
-          <a:fontRef idx="minor">
-            <a:schemeClr val="lt1"/>
-          </a:fontRef>
-        </p:style>
-        <p:txBody>
-          <a:bodyPr rtlCol="0" anchor="ctr"/>
-          <a:lstStyle/>
-          <a:p>
-            <a:pPr algn="ctr"/>
-            <a:endParaRPr lang="en-US"/>
-          </a:p>
-        </p:txBody>
-      </p:sp>
-      <p:sp>
-        <p:nvSpPr>
-          <p:cNvPr id="23" name="Down Arrow 22"/>
-          <p:cNvSpPr/>
-          <p:nvPr/>
-        </p:nvSpPr>
-        <p:spPr>
-          <a:xfrm>
-            <a:off x="4672317" y="4267199"/>
-            <a:ext cx="347695" cy="627085"/>
-          </a:xfrm>
-          <a:prstGeom prst="downArrow">
-            <a:avLst/>
-          </a:prstGeom>
-        </p:spPr>
-        <p:style>
-          <a:lnRef idx="2">
-            <a:schemeClr val="accent1">
-              <a:shade val="50000"/>
-            </a:schemeClr>
-          </a:lnRef>
-          <a:fillRef idx="1">
-            <a:schemeClr val="accent1"/>
-          </a:fillRef>
-          <a:effectRef idx="0">
-            <a:schemeClr val="accent1"/>
-          </a:effectRef>
-          <a:fontRef idx="minor">
-            <a:schemeClr val="lt1"/>
-          </a:fontRef>
-        </p:style>
-        <p:txBody>
-          <a:bodyPr rtlCol="0" anchor="ctr"/>
-          <a:lstStyle/>
-          <a:p>
-            <a:pPr algn="ctr"/>
-            <a:endParaRPr lang="en-US"/>
-          </a:p>
-        </p:txBody>
-      </p:sp>
-      <p:sp>
-        <p:nvSpPr>
-          <p:cNvPr id="24" name="Down Arrow 23"/>
-          <p:cNvSpPr/>
-          <p:nvPr/>
-        </p:nvSpPr>
-        <p:spPr>
-          <a:xfrm rot="18366039">
-            <a:off x="7027053" y="3790391"/>
-            <a:ext cx="347695" cy="1321811"/>
-          </a:xfrm>
-          <a:prstGeom prst="downArrow">
-            <a:avLst/>
-          </a:prstGeom>
-        </p:spPr>
-        <p:style>
-          <a:lnRef idx="2">
-            <a:schemeClr val="accent1">
-              <a:shade val="50000"/>
-            </a:schemeClr>
-          </a:lnRef>
-          <a:fillRef idx="1">
-            <a:schemeClr val="accent1"/>
-          </a:fillRef>
-          <a:effectRef idx="0">
-            <a:schemeClr val="accent1"/>
-          </a:effectRef>
-          <a:fontRef idx="minor">
-            <a:schemeClr val="lt1"/>
-          </a:fontRef>
-        </p:style>
-        <p:txBody>
-          <a:bodyPr rtlCol="0" anchor="ctr"/>
-          <a:lstStyle/>
-          <a:p>
-            <a:pPr algn="ctr"/>
-            <a:endParaRPr lang="en-US"/>
-          </a:p>
-        </p:txBody>
-      </p:sp>
-      <p:sp>
-        <p:nvSpPr>
-          <p:cNvPr id="25" name="Down Arrow 24"/>
-          <p:cNvSpPr/>
-          <p:nvPr/>
-        </p:nvSpPr>
-        <p:spPr>
-          <a:xfrm rot="16200000">
-            <a:off x="3225867" y="2559226"/>
-            <a:ext cx="347695" cy="820573"/>
-          </a:xfrm>
-          <a:prstGeom prst="downArrow">
-            <a:avLst/>
-          </a:prstGeom>
-        </p:spPr>
-        <p:style>
-          <a:lnRef idx="2">
-            <a:schemeClr val="accent1">
-              <a:shade val="50000"/>
-            </a:schemeClr>
-          </a:lnRef>
-          <a:fillRef idx="1">
-            <a:schemeClr val="accent1"/>
-          </a:fillRef>
-          <a:effectRef idx="0">
-            <a:schemeClr val="accent1"/>
-          </a:effectRef>
-          <a:fontRef idx="minor">
-            <a:schemeClr val="lt1"/>
-          </a:fontRef>
-        </p:style>
-        <p:txBody>
-          <a:bodyPr rtlCol="0" anchor="ctr"/>
-          <a:lstStyle/>
-          <a:p>
-            <a:pPr algn="ctr"/>
-            <a:endParaRPr lang="en-US"/>
-          </a:p>
-        </p:txBody>
-      </p:sp>
-      <p:sp>
-        <p:nvSpPr>
-          <p:cNvPr id="27" name="TextBox 26"/>
-          <p:cNvSpPr txBox="1"/>
-          <p:nvPr/>
-        </p:nvSpPr>
-        <p:spPr>
-          <a:xfrm>
-            <a:off x="838200" y="1446241"/>
-            <a:ext cx="1752600" cy="2308324"/>
-          </a:xfrm>
-          <a:prstGeom prst="rect">
-            <a:avLst/>
-          </a:prstGeom>
-          <a:noFill/>
-        </p:spPr>
-        <p:txBody>
-          <a:bodyPr wrap="square" rtlCol="0">
-            <a:spAutoFit/>
-          </a:bodyPr>
-          <a:lstStyle/>
-          <a:p>
-            <a:pPr algn="ctr"/>
-            <a:r>
-              <a:rPr lang="en-US" dirty="0" smtClean="0"/>
-              <a:t>Docker file</a:t>
-            </a:r>
-          </a:p>
-          <a:p>
-            <a:endParaRPr lang="en-US" dirty="0"/>
-          </a:p>
-          <a:p>
-            <a:pPr marL="285750" indent="-285750">
-              <a:buFont typeface="Wingdings"/>
-              <a:buChar char="Ø"/>
-            </a:pPr>
-            <a:r>
-              <a:rPr lang="en-US" dirty="0" smtClean="0"/>
-              <a:t>Nginx</a:t>
-            </a:r>
-          </a:p>
-          <a:p>
-            <a:pPr marL="285750" indent="-285750">
-              <a:buFont typeface="Wingdings"/>
-              <a:buChar char="Ø"/>
-            </a:pPr>
-            <a:r>
-              <a:rPr lang="en-US" dirty="0" err="1" smtClean="0"/>
-              <a:t>Php</a:t>
-            </a:r>
-            <a:endParaRPr lang="en-US" dirty="0" smtClean="0"/>
-          </a:p>
-          <a:p>
-            <a:pPr marL="285750" indent="-285750">
-              <a:buFont typeface="Wingdings"/>
-              <a:buChar char="Ø"/>
-            </a:pPr>
-            <a:r>
-              <a:rPr lang="en-US" dirty="0" smtClean="0"/>
-              <a:t>Java</a:t>
-            </a:r>
-          </a:p>
-          <a:p>
-            <a:pPr marL="285750" indent="-285750">
-              <a:buFont typeface="Wingdings"/>
-              <a:buChar char="Ø"/>
-            </a:pPr>
-            <a:r>
-              <a:rPr lang="en-US" dirty="0" smtClean="0"/>
-              <a:t>…</a:t>
-            </a:r>
-          </a:p>
-          <a:p>
-            <a:pPr marL="285750" indent="-285750">
-              <a:buFont typeface="Wingdings"/>
-              <a:buChar char="Ø"/>
-            </a:pPr>
-            <a:r>
-              <a:rPr lang="en-US" dirty="0" smtClean="0"/>
-              <a:t>…</a:t>
-            </a:r>
-          </a:p>
-          <a:p>
-            <a:pPr marL="285750" indent="-285750">
-              <a:buFont typeface="Wingdings"/>
-              <a:buChar char="Ø"/>
-            </a:pPr>
-            <a:endParaRPr lang="en-US" dirty="0"/>
-          </a:p>
-        </p:txBody>
-      </p:sp>
+        </p:grpSpPr>
+        <p:sp>
+          <p:nvSpPr>
+            <p:cNvPr id="16" name="Rectangle 15"/>
+            <p:cNvSpPr/>
+            <p:nvPr/>
+          </p:nvSpPr>
+          <p:spPr>
+            <a:xfrm>
+              <a:off x="656798" y="1397000"/>
+              <a:ext cx="2133600" cy="2667000"/>
+            </a:xfrm>
+            <a:prstGeom prst="rect">
+              <a:avLst/>
+            </a:prstGeom>
+          </p:spPr>
+          <p:style>
+            <a:lnRef idx="2">
+              <a:schemeClr val="accent1">
+                <a:shade val="50000"/>
+              </a:schemeClr>
+            </a:lnRef>
+            <a:fillRef idx="1">
+              <a:schemeClr val="accent1"/>
+            </a:fillRef>
+            <a:effectRef idx="0">
+              <a:schemeClr val="accent1"/>
+            </a:effectRef>
+            <a:fontRef idx="minor">
+              <a:schemeClr val="lt1"/>
+            </a:fontRef>
+          </p:style>
+          <p:txBody>
+            <a:bodyPr rtlCol="0" anchor="ctr"/>
+            <a:lstStyle/>
+            <a:p>
+              <a:pPr algn="ctr"/>
+              <a:endParaRPr lang="en-US" dirty="0"/>
+            </a:p>
+          </p:txBody>
+        </p:sp>
+        <p:sp>
+          <p:nvSpPr>
+            <p:cNvPr id="18" name="Cube 17"/>
+            <p:cNvSpPr/>
+            <p:nvPr/>
+          </p:nvSpPr>
+          <p:spPr>
+            <a:xfrm>
+              <a:off x="3962400" y="1397000"/>
+              <a:ext cx="2286000" cy="2667000"/>
+            </a:xfrm>
+            <a:prstGeom prst="cube">
+              <a:avLst/>
+            </a:prstGeom>
+          </p:spPr>
+          <p:style>
+            <a:lnRef idx="2">
+              <a:schemeClr val="accent1">
+                <a:shade val="50000"/>
+              </a:schemeClr>
+            </a:lnRef>
+            <a:fillRef idx="1">
+              <a:schemeClr val="accent1"/>
+            </a:fillRef>
+            <a:effectRef idx="0">
+              <a:schemeClr val="accent1"/>
+            </a:effectRef>
+            <a:fontRef idx="minor">
+              <a:schemeClr val="lt1"/>
+            </a:fontRef>
+          </p:style>
+          <p:txBody>
+            <a:bodyPr rtlCol="0" anchor="ctr"/>
+            <a:lstStyle/>
+            <a:p>
+              <a:pPr algn="ctr"/>
+              <a:r>
+                <a:rPr lang="en-US" dirty="0" err="1" smtClean="0"/>
+                <a:t>Dcoker</a:t>
+              </a:r>
+              <a:r>
+                <a:rPr lang="en-US" dirty="0" smtClean="0"/>
+                <a:t> Image</a:t>
+              </a:r>
+              <a:endParaRPr lang="en-US" dirty="0"/>
+            </a:p>
+          </p:txBody>
+        </p:sp>
+        <p:sp>
+          <p:nvSpPr>
+            <p:cNvPr id="19" name="Bevel 18"/>
+            <p:cNvSpPr/>
+            <p:nvPr/>
+          </p:nvSpPr>
+          <p:spPr>
+            <a:xfrm>
+              <a:off x="627228" y="4968209"/>
+              <a:ext cx="2362200" cy="914400"/>
+            </a:xfrm>
+            <a:prstGeom prst="bevel">
+              <a:avLst/>
+            </a:prstGeom>
+          </p:spPr>
+          <p:style>
+            <a:lnRef idx="2">
+              <a:schemeClr val="accent1">
+                <a:shade val="50000"/>
+              </a:schemeClr>
+            </a:lnRef>
+            <a:fillRef idx="1">
+              <a:schemeClr val="accent1"/>
+            </a:fillRef>
+            <a:effectRef idx="0">
+              <a:schemeClr val="accent1"/>
+            </a:effectRef>
+            <a:fontRef idx="minor">
+              <a:schemeClr val="lt1"/>
+            </a:fontRef>
+          </p:style>
+          <p:txBody>
+            <a:bodyPr rtlCol="0" anchor="ctr"/>
+            <a:lstStyle/>
+            <a:p>
+              <a:pPr algn="ctr"/>
+              <a:r>
+                <a:rPr lang="en-US" dirty="0" smtClean="0"/>
+                <a:t>Container</a:t>
+              </a:r>
+              <a:endParaRPr lang="en-US" dirty="0"/>
+            </a:p>
+          </p:txBody>
+        </p:sp>
+        <p:sp>
+          <p:nvSpPr>
+            <p:cNvPr id="20" name="Bevel 19"/>
+            <p:cNvSpPr/>
+            <p:nvPr/>
+          </p:nvSpPr>
+          <p:spPr>
+            <a:xfrm>
+              <a:off x="3657600" y="5003800"/>
+              <a:ext cx="2362200" cy="914400"/>
+            </a:xfrm>
+            <a:prstGeom prst="bevel">
+              <a:avLst/>
+            </a:prstGeom>
+          </p:spPr>
+          <p:style>
+            <a:lnRef idx="2">
+              <a:schemeClr val="accent1">
+                <a:shade val="50000"/>
+              </a:schemeClr>
+            </a:lnRef>
+            <a:fillRef idx="1">
+              <a:schemeClr val="accent1"/>
+            </a:fillRef>
+            <a:effectRef idx="0">
+              <a:schemeClr val="accent1"/>
+            </a:effectRef>
+            <a:fontRef idx="minor">
+              <a:schemeClr val="lt1"/>
+            </a:fontRef>
+          </p:style>
+          <p:txBody>
+            <a:bodyPr rtlCol="0" anchor="ctr"/>
+            <a:lstStyle/>
+            <a:p>
+              <a:pPr algn="ctr"/>
+              <a:r>
+                <a:rPr lang="en-US" dirty="0" smtClean="0"/>
+                <a:t>Container</a:t>
+              </a:r>
+              <a:endParaRPr lang="en-US" dirty="0"/>
+            </a:p>
+          </p:txBody>
+        </p:sp>
+        <p:sp>
+          <p:nvSpPr>
+            <p:cNvPr id="21" name="Bevel 20"/>
+            <p:cNvSpPr/>
+            <p:nvPr/>
+          </p:nvSpPr>
+          <p:spPr>
+            <a:xfrm>
+              <a:off x="6438900" y="5003800"/>
+              <a:ext cx="2362200" cy="914400"/>
+            </a:xfrm>
+            <a:prstGeom prst="bevel">
+              <a:avLst/>
+            </a:prstGeom>
+          </p:spPr>
+          <p:style>
+            <a:lnRef idx="2">
+              <a:schemeClr val="accent1">
+                <a:shade val="50000"/>
+              </a:schemeClr>
+            </a:lnRef>
+            <a:fillRef idx="1">
+              <a:schemeClr val="accent1"/>
+            </a:fillRef>
+            <a:effectRef idx="0">
+              <a:schemeClr val="accent1"/>
+            </a:effectRef>
+            <a:fontRef idx="minor">
+              <a:schemeClr val="lt1"/>
+            </a:fontRef>
+          </p:style>
+          <p:txBody>
+            <a:bodyPr rtlCol="0" anchor="ctr"/>
+            <a:lstStyle/>
+            <a:p>
+              <a:pPr algn="ctr"/>
+              <a:r>
+                <a:rPr lang="en-US" dirty="0" smtClean="0"/>
+                <a:t>Container</a:t>
+              </a:r>
+              <a:endParaRPr lang="en-US" dirty="0"/>
+            </a:p>
+          </p:txBody>
+        </p:sp>
+        <p:sp>
+          <p:nvSpPr>
+            <p:cNvPr id="22" name="Down Arrow 21"/>
+            <p:cNvSpPr/>
+            <p:nvPr/>
+          </p:nvSpPr>
+          <p:spPr>
+            <a:xfrm rot="3859780">
+              <a:off x="2631819" y="3790391"/>
+              <a:ext cx="347695" cy="1321811"/>
+            </a:xfrm>
+            <a:prstGeom prst="downArrow">
+              <a:avLst/>
+            </a:prstGeom>
+          </p:spPr>
+          <p:style>
+            <a:lnRef idx="2">
+              <a:schemeClr val="accent1">
+                <a:shade val="50000"/>
+              </a:schemeClr>
+            </a:lnRef>
+            <a:fillRef idx="1">
+              <a:schemeClr val="accent1"/>
+            </a:fillRef>
+            <a:effectRef idx="0">
+              <a:schemeClr val="accent1"/>
+            </a:effectRef>
+            <a:fontRef idx="minor">
+              <a:schemeClr val="lt1"/>
+            </a:fontRef>
+          </p:style>
+          <p:txBody>
+            <a:bodyPr rtlCol="0" anchor="ctr"/>
+            <a:lstStyle/>
+            <a:p>
+              <a:pPr algn="ctr"/>
+              <a:endParaRPr lang="en-US"/>
+            </a:p>
+          </p:txBody>
+        </p:sp>
+        <p:sp>
+          <p:nvSpPr>
+            <p:cNvPr id="23" name="Down Arrow 22"/>
+            <p:cNvSpPr/>
+            <p:nvPr/>
+          </p:nvSpPr>
+          <p:spPr>
+            <a:xfrm>
+              <a:off x="4672317" y="4267199"/>
+              <a:ext cx="347695" cy="627085"/>
+            </a:xfrm>
+            <a:prstGeom prst="downArrow">
+              <a:avLst/>
+            </a:prstGeom>
+          </p:spPr>
+          <p:style>
+            <a:lnRef idx="2">
+              <a:schemeClr val="accent1">
+                <a:shade val="50000"/>
+              </a:schemeClr>
+            </a:lnRef>
+            <a:fillRef idx="1">
+              <a:schemeClr val="accent1"/>
+            </a:fillRef>
+            <a:effectRef idx="0">
+              <a:schemeClr val="accent1"/>
+            </a:effectRef>
+            <a:fontRef idx="minor">
+              <a:schemeClr val="lt1"/>
+            </a:fontRef>
+          </p:style>
+          <p:txBody>
+            <a:bodyPr rtlCol="0" anchor="ctr"/>
+            <a:lstStyle/>
+            <a:p>
+              <a:pPr algn="ctr"/>
+              <a:endParaRPr lang="en-US"/>
+            </a:p>
+          </p:txBody>
+        </p:sp>
+        <p:sp>
+          <p:nvSpPr>
+            <p:cNvPr id="24" name="Down Arrow 23"/>
+            <p:cNvSpPr/>
+            <p:nvPr/>
+          </p:nvSpPr>
+          <p:spPr>
+            <a:xfrm rot="18366039">
+              <a:off x="7027053" y="3790391"/>
+              <a:ext cx="347695" cy="1321811"/>
+            </a:xfrm>
+            <a:prstGeom prst="downArrow">
+              <a:avLst/>
+            </a:prstGeom>
+          </p:spPr>
+          <p:style>
+            <a:lnRef idx="2">
+              <a:schemeClr val="accent1">
+                <a:shade val="50000"/>
+              </a:schemeClr>
+            </a:lnRef>
+            <a:fillRef idx="1">
+              <a:schemeClr val="accent1"/>
+            </a:fillRef>
+            <a:effectRef idx="0">
+              <a:schemeClr val="accent1"/>
+            </a:effectRef>
+            <a:fontRef idx="minor">
+              <a:schemeClr val="lt1"/>
+            </a:fontRef>
+          </p:style>
+          <p:txBody>
+            <a:bodyPr rtlCol="0" anchor="ctr"/>
+            <a:lstStyle/>
+            <a:p>
+              <a:pPr algn="ctr"/>
+              <a:endParaRPr lang="en-US"/>
+            </a:p>
+          </p:txBody>
+        </p:sp>
+        <p:sp>
+          <p:nvSpPr>
+            <p:cNvPr id="25" name="Down Arrow 24"/>
+            <p:cNvSpPr/>
+            <p:nvPr/>
+          </p:nvSpPr>
+          <p:spPr>
+            <a:xfrm rot="16200000">
+              <a:off x="3225867" y="2559226"/>
+              <a:ext cx="347695" cy="820573"/>
+            </a:xfrm>
+            <a:prstGeom prst="downArrow">
+              <a:avLst/>
+            </a:prstGeom>
+          </p:spPr>
+          <p:style>
+            <a:lnRef idx="2">
+              <a:schemeClr val="accent1">
+                <a:shade val="50000"/>
+              </a:schemeClr>
+            </a:lnRef>
+            <a:fillRef idx="1">
+              <a:schemeClr val="accent1"/>
+            </a:fillRef>
+            <a:effectRef idx="0">
+              <a:schemeClr val="accent1"/>
+            </a:effectRef>
+            <a:fontRef idx="minor">
+              <a:schemeClr val="lt1"/>
+            </a:fontRef>
+          </p:style>
+          <p:txBody>
+            <a:bodyPr rtlCol="0" anchor="ctr"/>
+            <a:lstStyle/>
+            <a:p>
+              <a:pPr algn="ctr"/>
+              <a:endParaRPr lang="en-US"/>
+            </a:p>
+          </p:txBody>
+        </p:sp>
+        <p:sp>
+          <p:nvSpPr>
+            <p:cNvPr id="27" name="TextBox 26"/>
+            <p:cNvSpPr txBox="1"/>
+            <p:nvPr/>
+          </p:nvSpPr>
+          <p:spPr>
+            <a:xfrm>
+              <a:off x="838200" y="1446241"/>
+              <a:ext cx="1752600" cy="2308324"/>
+            </a:xfrm>
+            <a:prstGeom prst="rect">
+              <a:avLst/>
+            </a:prstGeom>
+            <a:noFill/>
+          </p:spPr>
+          <p:txBody>
+            <a:bodyPr wrap="square" rtlCol="0">
+              <a:spAutoFit/>
+            </a:bodyPr>
+            <a:lstStyle/>
+            <a:p>
+              <a:pPr algn="ctr"/>
+              <a:r>
+                <a:rPr lang="en-US" dirty="0" smtClean="0"/>
+                <a:t>Docker file</a:t>
+              </a:r>
+            </a:p>
+            <a:p>
+              <a:endParaRPr lang="en-US" dirty="0"/>
+            </a:p>
+            <a:p>
+              <a:pPr marL="285750" indent="-285750">
+                <a:buFont typeface="Wingdings"/>
+                <a:buChar char="Ø"/>
+              </a:pPr>
+              <a:r>
+                <a:rPr lang="en-US" dirty="0" smtClean="0"/>
+                <a:t>Nginx</a:t>
+              </a:r>
+            </a:p>
+            <a:p>
+              <a:pPr marL="285750" indent="-285750">
+                <a:buFont typeface="Wingdings"/>
+                <a:buChar char="Ø"/>
+              </a:pPr>
+              <a:r>
+                <a:rPr lang="en-US" dirty="0" err="1" smtClean="0"/>
+                <a:t>Php</a:t>
+              </a:r>
+              <a:endParaRPr lang="en-US" dirty="0" smtClean="0"/>
+            </a:p>
+            <a:p>
+              <a:pPr marL="285750" indent="-285750">
+                <a:buFont typeface="Wingdings"/>
+                <a:buChar char="Ø"/>
+              </a:pPr>
+              <a:r>
+                <a:rPr lang="en-US" dirty="0" smtClean="0"/>
+                <a:t>Java</a:t>
+              </a:r>
+            </a:p>
+            <a:p>
+              <a:pPr marL="285750" indent="-285750">
+                <a:buFont typeface="Wingdings"/>
+                <a:buChar char="Ø"/>
+              </a:pPr>
+              <a:r>
+                <a:rPr lang="en-US" dirty="0" smtClean="0"/>
+                <a:t>…</a:t>
+              </a:r>
+            </a:p>
+            <a:p>
+              <a:pPr marL="285750" indent="-285750">
+                <a:buFont typeface="Wingdings"/>
+                <a:buChar char="Ø"/>
+              </a:pPr>
+              <a:r>
+                <a:rPr lang="en-US" dirty="0" smtClean="0"/>
+                <a:t>…</a:t>
+              </a:r>
+            </a:p>
+            <a:p>
+              <a:pPr marL="285750" indent="-285750">
+                <a:buFont typeface="Wingdings"/>
+                <a:buChar char="Ø"/>
+              </a:pPr>
+              <a:endParaRPr lang="en-US" dirty="0"/>
+            </a:p>
+          </p:txBody>
+        </p:sp>
+      </p:grpSp>
       <p:sp>
         <p:nvSpPr>
           <p:cNvPr id="3" name="TextBox 2"/>
@@ -6267,9 +8841,10 @@
               <a:t>docker</a:t>
             </a:r>
             <a:r>
-              <a:rPr lang="en-US" dirty="0" smtClean="0"/>
+              <a:rPr lang="en-US" smtClean="0"/>
               <a:t> --version</a:t>
             </a:r>
+            <a:endParaRPr lang="en-US" dirty="0" smtClean="0"/>
           </a:p>
           <a:p>
             <a:endParaRPr lang="en-US" dirty="0">
@@ -6318,13 +8893,6 @@
   <p:clrMapOvr>
     <a:masterClrMapping/>
   </p:clrMapOvr>
-  <p:timing>
-    <p:tnLst>
-      <p:par>
-        <p:cTn id="1" dur="indefinite" restart="never" nodeType="tmRoot"/>
-      </p:par>
-    </p:tnLst>
-  </p:timing>
 </p:sld>
 </file>
 
@@ -6723,13 +9291,6 @@
   <p:clrMapOvr>
     <a:masterClrMapping/>
   </p:clrMapOvr>
-  <p:timing>
-    <p:tnLst>
-      <p:par>
-        <p:cTn id="1" dur="indefinite" restart="never" nodeType="tmRoot"/>
-      </p:par>
-    </p:tnLst>
-  </p:timing>
 </p:sld>
 </file>
 
@@ -6816,14 +9377,13 @@
               <a:t>docker</a:t>
             </a:r>
             <a:r>
-              <a:rPr lang="en-US" b="1" i="1"/>
+              <a:rPr lang="en-US" b="1" i="1" dirty="0"/>
               <a:t> </a:t>
             </a:r>
             <a:r>
-              <a:rPr lang="en-US" b="1" i="1" smtClean="0"/>
-              <a:t>images ls</a:t>
-            </a:r>
-            <a:endParaRPr lang="en-US" b="1" i="1" dirty="0" smtClean="0"/>
+              <a:rPr lang="en-US" b="1" i="1" dirty="0" smtClean="0"/>
+              <a:t>images</a:t>
+            </a:r>
           </a:p>
           <a:p>
             <a:r>
@@ -7162,13 +9722,6 @@
   <p:clrMapOvr>
     <a:masterClrMapping/>
   </p:clrMapOvr>
-  <p:timing>
-    <p:tnLst>
-      <p:par>
-        <p:cTn id="1" dur="indefinite" restart="never" nodeType="tmRoot"/>
-      </p:par>
-    </p:tnLst>
-  </p:timing>
 </p:sld>
 </file>
 

</xml_diff>